<commit_message>
Enhance workshop experience by adding detailed hands-on workshop instructions to the homepage, improving layout and styling for better user engagement. Update package.json to include pptxgenjs dependency for presentation generation. Revise scenario interaction in multiple HTML files for consistency and clarity, ensuring a more intuitive user experience.
</commit_message>
<xml_diff>
--- a/AI_Superpowers_Workshop_v3.pptx
+++ b/AI_Superpowers_Workshop_v3.pptx
@@ -4,6 +4,9 @@
   <p:sldMasterIdLst>
     <p:sldMasterId id="2147483648" r:id="rId1"/>
   </p:sldMasterIdLst>
+  <p:notesMasterIdLst>
+    <p:notesMasterId r:id="rId17"/>
+  </p:notesMasterIdLst>
   <p:sldIdLst>
     <p:sldId id="256" r:id="rId2"/>
     <p:sldId id="257" r:id="rId3"/>
@@ -21,10 +24,7 @@
     <p:sldId id="269" r:id="rId15"/>
     <p:sldId id="270" r:id="rId16"/>
   </p:sldIdLst>
-  <p:notesMasterIdLst>
-    <p:notesMasterId r:id="rId17"/>
-  </p:notesMasterIdLst>
-  <p:sldSz cx="9144000" cy="5143500"/>
+  <p:sldSz cx="9144000" cy="5143500" type="screen16x9"/>
   <p:notesSz cx="5143500" cy="9144000"/>
   <p:defaultTextStyle>
     <a:lvl1pPr marL="0" algn="l" defTabSz="914400" rtl="0" eaLnBrk="1" latinLnBrk="0" hangingPunct="1">
@@ -118,7 +118,111 @@
       </a:defRPr>
     </a:lvl9pPr>
   </p:defaultTextStyle>
+  <p:extLst>
+    <p:ext uri="{EFAFB233-063F-42B5-8137-9DF3F51BA10A}">
+      <p15:sldGuideLst xmlns:p15="http://schemas.microsoft.com/office/powerpoint/2012/main"/>
+    </p:ext>
+  </p:extLst>
 </p:presentation>
+</file>
+
+<file path=ppt/revisionInfo.xml><?xml version="1.0" encoding="utf-8"?>
+<p1510:revInfo xmlns:a="http://schemas.openxmlformats.org/drawingml/2006/main" xmlns:r="http://schemas.openxmlformats.org/officeDocument/2006/relationships" xmlns:p1510="http://schemas.microsoft.com/office/powerpoint/2015/10/main">
+  <p1510:revLst>
+    <p1510:client id="{CE4C23B9-7D2D-FF0E-2BC6-8302B10A8CEF}" v="28" dt="2026-01-19T23:07:00.915"/>
+  </p1510:revLst>
+</p1510:revInfo>
+</file>
+
+<file path=ppt/changesInfos/changesInfo1.xml><?xml version="1.0" encoding="utf-8"?>
+<pc:chgInfo xmlns:a="http://schemas.openxmlformats.org/drawingml/2006/main" xmlns:r="http://schemas.openxmlformats.org/officeDocument/2006/relationships" xmlns:ac="http://schemas.microsoft.com/office/drawing/2013/main/command" xmlns:pc="http://schemas.microsoft.com/office/powerpoint/2013/main/command">
+  <pc:docChgLst>
+    <pc:chgData name="Guest User" providerId="Windows Live" clId="Web-{CE4C23B9-7D2D-FF0E-2BC6-8302B10A8CEF}"/>
+    <pc:docChg chg="modSld">
+      <pc:chgData name="Guest User" userId="" providerId="Windows Live" clId="Web-{CE4C23B9-7D2D-FF0E-2BC6-8302B10A8CEF}" dt="2026-01-19T23:07:00.915" v="21" actId="14100"/>
+      <pc:docMkLst>
+        <pc:docMk/>
+      </pc:docMkLst>
+      <pc:sldChg chg="modSp">
+        <pc:chgData name="Guest User" userId="" providerId="Windows Live" clId="Web-{CE4C23B9-7D2D-FF0E-2BC6-8302B10A8CEF}" dt="2026-01-19T23:05:51.226" v="2" actId="20577"/>
+        <pc:sldMkLst>
+          <pc:docMk/>
+          <pc:sldMk cId="0" sldId="256"/>
+        </pc:sldMkLst>
+        <pc:spChg chg="mod">
+          <ac:chgData name="Guest User" userId="" providerId="Windows Live" clId="Web-{CE4C23B9-7D2D-FF0E-2BC6-8302B10A8CEF}" dt="2026-01-19T23:05:51.226" v="2" actId="20577"/>
+          <ac:spMkLst>
+            <pc:docMk/>
+            <pc:sldMk cId="0" sldId="256"/>
+            <ac:spMk id="14" creationId="{00000000-0000-0000-0000-000000000000}"/>
+          </ac:spMkLst>
+        </pc:spChg>
+      </pc:sldChg>
+      <pc:sldChg chg="modSp">
+        <pc:chgData name="Guest User" userId="" providerId="Windows Live" clId="Web-{CE4C23B9-7D2D-FF0E-2BC6-8302B10A8CEF}" dt="2026-01-19T23:06:49.227" v="20" actId="20577"/>
+        <pc:sldMkLst>
+          <pc:docMk/>
+          <pc:sldMk cId="0" sldId="257"/>
+        </pc:sldMkLst>
+        <pc:spChg chg="mod">
+          <ac:chgData name="Guest User" userId="" providerId="Windows Live" clId="Web-{CE4C23B9-7D2D-FF0E-2BC6-8302B10A8CEF}" dt="2026-01-19T23:06:17.711" v="12" actId="20577"/>
+          <ac:spMkLst>
+            <pc:docMk/>
+            <pc:sldMk cId="0" sldId="257"/>
+            <ac:spMk id="5" creationId="{00000000-0000-0000-0000-000000000000}"/>
+          </ac:spMkLst>
+        </pc:spChg>
+        <pc:spChg chg="mod">
+          <ac:chgData name="Guest User" userId="" providerId="Windows Live" clId="Web-{CE4C23B9-7D2D-FF0E-2BC6-8302B10A8CEF}" dt="2026-01-19T23:06:45.696" v="17" actId="20577"/>
+          <ac:spMkLst>
+            <pc:docMk/>
+            <pc:sldMk cId="0" sldId="257"/>
+            <ac:spMk id="13" creationId="{00000000-0000-0000-0000-000000000000}"/>
+          </ac:spMkLst>
+        </pc:spChg>
+        <pc:spChg chg="mod">
+          <ac:chgData name="Guest User" userId="" providerId="Windows Live" clId="Web-{CE4C23B9-7D2D-FF0E-2BC6-8302B10A8CEF}" dt="2026-01-19T23:06:39.899" v="15" actId="20577"/>
+          <ac:spMkLst>
+            <pc:docMk/>
+            <pc:sldMk cId="0" sldId="257"/>
+            <ac:spMk id="18" creationId="{00000000-0000-0000-0000-000000000000}"/>
+          </ac:spMkLst>
+        </pc:spChg>
+        <pc:spChg chg="mod">
+          <ac:chgData name="Guest User" userId="" providerId="Windows Live" clId="Web-{CE4C23B9-7D2D-FF0E-2BC6-8302B10A8CEF}" dt="2026-01-19T23:06:47.977" v="18" actId="20577"/>
+          <ac:spMkLst>
+            <pc:docMk/>
+            <pc:sldMk cId="0" sldId="257"/>
+            <ac:spMk id="30" creationId="{00000000-0000-0000-0000-000000000000}"/>
+          </ac:spMkLst>
+        </pc:spChg>
+        <pc:spChg chg="mod">
+          <ac:chgData name="Guest User" userId="" providerId="Windows Live" clId="Web-{CE4C23B9-7D2D-FF0E-2BC6-8302B10A8CEF}" dt="2026-01-19T23:06:49.227" v="20" actId="20577"/>
+          <ac:spMkLst>
+            <pc:docMk/>
+            <pc:sldMk cId="0" sldId="257"/>
+            <ac:spMk id="32" creationId="{00000000-0000-0000-0000-000000000000}"/>
+          </ac:spMkLst>
+        </pc:spChg>
+      </pc:sldChg>
+      <pc:sldChg chg="modSp">
+        <pc:chgData name="Guest User" userId="" providerId="Windows Live" clId="Web-{CE4C23B9-7D2D-FF0E-2BC6-8302B10A8CEF}" dt="2026-01-19T23:07:00.915" v="21" actId="14100"/>
+        <pc:sldMkLst>
+          <pc:docMk/>
+          <pc:sldMk cId="0" sldId="258"/>
+        </pc:sldMkLst>
+        <pc:spChg chg="mod">
+          <ac:chgData name="Guest User" userId="" providerId="Windows Live" clId="Web-{CE4C23B9-7D2D-FF0E-2BC6-8302B10A8CEF}" dt="2026-01-19T23:07:00.915" v="21" actId="14100"/>
+          <ac:spMkLst>
+            <pc:docMk/>
+            <pc:sldMk cId="0" sldId="258"/>
+            <ac:spMk id="7" creationId="{00000000-0000-0000-0000-000000000000}"/>
+          </ac:spMkLst>
+        </pc:spChg>
+      </pc:sldChg>
+    </pc:docChg>
+  </pc:docChgLst>
+</pc:chgInfo>
 </file>
 
 <file path=ppt/notesMasters/notesMaster1.xml><?xml version="1.0" encoding="utf-8"?>
@@ -156,7 +260,7 @@
         <p:spPr>
           <a:xfrm>
             <a:off x="0" y="0"/>
-            <a:ext cx="2971800" cy="458788"/>
+            <a:ext cx="2228850" cy="458788"/>
           </a:xfrm>
           <a:prstGeom prst="rect">
             <a:avLst/>
@@ -186,8 +290,8 @@
         </p:nvSpPr>
         <p:spPr>
           <a:xfrm>
-            <a:off x="3884613" y="0"/>
-            <a:ext cx="2971800" cy="458788"/>
+            <a:off x="2913063" y="0"/>
+            <a:ext cx="2228850" cy="458788"/>
           </a:xfrm>
           <a:prstGeom prst="rect">
             <a:avLst/>
@@ -201,9 +305,8 @@
             </a:lvl1pPr>
           </a:lstStyle>
           <a:p>
-            <a:fld id="{5282F153-3F37-0F45-9E97-73ACFA13230C}" type="datetimeFigureOut">
-              <a:rPr lang="en-US"/>
-              <a:t>7/23/19</a:t>
+            <a:fld id="{1A33EEAD-A875-40C0-995A-1210F6271A95}" type="datetimeFigureOut">
+              <a:t>1/19/2026</a:t>
             </a:fld>
             <a:endParaRPr lang="en-US"/>
           </a:p>
@@ -221,7 +324,7 @@
         </p:nvSpPr>
         <p:spPr>
           <a:xfrm>
-            <a:off x="685800" y="1143000"/>
+            <a:off x="-171450" y="1143000"/>
             <a:ext cx="5486400" cy="3086100"/>
           </a:xfrm>
           <a:prstGeom prst="rect">
@@ -254,8 +357,8 @@
         </p:nvSpPr>
         <p:spPr>
           <a:xfrm>
-            <a:off x="685800" y="4400550"/>
-            <a:ext cx="5486400" cy="3600450"/>
+            <a:off x="514350" y="4400550"/>
+            <a:ext cx="4114800" cy="3600450"/>
           </a:xfrm>
           <a:prstGeom prst="rect">
             <a:avLst/>
@@ -314,7 +417,7 @@
         <p:spPr>
           <a:xfrm>
             <a:off x="0" y="8685213"/>
-            <a:ext cx="2971800" cy="458787"/>
+            <a:ext cx="2228850" cy="458787"/>
           </a:xfrm>
           <a:prstGeom prst="rect">
             <a:avLst/>
@@ -344,8 +447,8 @@
         </p:nvSpPr>
         <p:spPr>
           <a:xfrm>
-            <a:off x="3884613" y="8685213"/>
-            <a:ext cx="2971800" cy="458787"/>
+            <a:off x="2913063" y="8685213"/>
+            <a:ext cx="2228850" cy="458787"/>
           </a:xfrm>
           <a:prstGeom prst="rect">
             <a:avLst/>
@@ -359,8 +462,7 @@
             </a:lvl1pPr>
           </a:lstStyle>
           <a:p>
-            <a:fld id="{CE5E9CC1-C706-0F49-92D6-E571CC5EEA8F}" type="slidenum">
-              <a:rPr lang="en-US"/>
+            <a:fld id="{8BBAE7D7-CC01-4716-A9E4-5A73B6466778}" type="slidenum">
               <a:t>‹#›</a:t>
             </a:fld>
             <a:endParaRPr lang="en-US"/>
@@ -370,7 +472,7 @@
     </p:spTree>
     <p:extLst>
       <p:ext uri="{BB962C8B-B14F-4D97-AF65-F5344CB8AC3E}">
-        <p14:creationId xmlns:p14="http://schemas.microsoft.com/office/powerpoint/2010/main" val="1024086991"/>
+        <p14:creationId xmlns:p14="http://schemas.microsoft.com/office/powerpoint/2010/main" val="3888780567"/>
       </p:ext>
     </p:extLst>
   </p:cSld>
@@ -514,10 +616,6 @@
           <a:bodyPr/>
           <a:lstStyle/>
           <a:p>
-            <a:r>
-              <a:rPr lang="en-US" dirty="0"/>
-              <a:t/>
-            </a:r>
             <a:endParaRPr lang="en-US" dirty="0"/>
           </a:p>
         </p:txBody>
@@ -602,10 +700,6 @@
           <a:bodyPr/>
           <a:lstStyle/>
           <a:p>
-            <a:r>
-              <a:rPr lang="en-US" dirty="0"/>
-              <a:t/>
-            </a:r>
             <a:endParaRPr lang="en-US" dirty="0"/>
           </a:p>
         </p:txBody>
@@ -690,10 +784,6 @@
           <a:bodyPr/>
           <a:lstStyle/>
           <a:p>
-            <a:r>
-              <a:rPr lang="en-US" dirty="0"/>
-              <a:t/>
-            </a:r>
             <a:endParaRPr lang="en-US" dirty="0"/>
           </a:p>
         </p:txBody>
@@ -778,10 +868,6 @@
           <a:bodyPr/>
           <a:lstStyle/>
           <a:p>
-            <a:r>
-              <a:rPr lang="en-US" dirty="0"/>
-              <a:t/>
-            </a:r>
             <a:endParaRPr lang="en-US" dirty="0"/>
           </a:p>
         </p:txBody>
@@ -866,10 +952,6 @@
           <a:bodyPr/>
           <a:lstStyle/>
           <a:p>
-            <a:r>
-              <a:rPr lang="en-US" dirty="0"/>
-              <a:t/>
-            </a:r>
             <a:endParaRPr lang="en-US" dirty="0"/>
           </a:p>
         </p:txBody>
@@ -954,10 +1036,6 @@
           <a:bodyPr/>
           <a:lstStyle/>
           <a:p>
-            <a:r>
-              <a:rPr lang="en-US" dirty="0"/>
-              <a:t/>
-            </a:r>
             <a:endParaRPr lang="en-US" dirty="0"/>
           </a:p>
         </p:txBody>
@@ -1042,10 +1120,6 @@
           <a:bodyPr/>
           <a:lstStyle/>
           <a:p>
-            <a:r>
-              <a:rPr lang="en-US" dirty="0"/>
-              <a:t/>
-            </a:r>
             <a:endParaRPr lang="en-US" dirty="0"/>
           </a:p>
         </p:txBody>
@@ -1130,10 +1204,6 @@
           <a:bodyPr/>
           <a:lstStyle/>
           <a:p>
-            <a:r>
-              <a:rPr lang="en-US" dirty="0"/>
-              <a:t/>
-            </a:r>
             <a:endParaRPr lang="en-US" dirty="0"/>
           </a:p>
         </p:txBody>
@@ -1218,10 +1288,6 @@
           <a:bodyPr/>
           <a:lstStyle/>
           <a:p>
-            <a:r>
-              <a:rPr lang="en-US" dirty="0"/>
-              <a:t/>
-            </a:r>
             <a:endParaRPr lang="en-US" dirty="0"/>
           </a:p>
         </p:txBody>
@@ -1306,10 +1372,6 @@
           <a:bodyPr/>
           <a:lstStyle/>
           <a:p>
-            <a:r>
-              <a:rPr lang="en-US" dirty="0"/>
-              <a:t/>
-            </a:r>
             <a:endParaRPr lang="en-US" dirty="0"/>
           </a:p>
         </p:txBody>
@@ -1394,10 +1456,6 @@
           <a:bodyPr/>
           <a:lstStyle/>
           <a:p>
-            <a:r>
-              <a:rPr lang="en-US" dirty="0"/>
-              <a:t/>
-            </a:r>
             <a:endParaRPr lang="en-US" dirty="0"/>
           </a:p>
         </p:txBody>
@@ -1482,10 +1540,6 @@
           <a:bodyPr/>
           <a:lstStyle/>
           <a:p>
-            <a:r>
-              <a:rPr lang="en-US" dirty="0"/>
-              <a:t/>
-            </a:r>
             <a:endParaRPr lang="en-US" dirty="0"/>
           </a:p>
         </p:txBody>
@@ -1570,10 +1624,6 @@
           <a:bodyPr/>
           <a:lstStyle/>
           <a:p>
-            <a:r>
-              <a:rPr lang="en-US" dirty="0"/>
-              <a:t/>
-            </a:r>
             <a:endParaRPr lang="en-US" dirty="0"/>
           </a:p>
         </p:txBody>
@@ -1658,10 +1708,6 @@
           <a:bodyPr/>
           <a:lstStyle/>
           <a:p>
-            <a:r>
-              <a:rPr lang="en-US" dirty="0"/>
-              <a:t/>
-            </a:r>
             <a:endParaRPr lang="en-US" dirty="0"/>
           </a:p>
         </p:txBody>
@@ -1746,10 +1792,6 @@
           <a:bodyPr/>
           <a:lstStyle/>
           <a:p>
-            <a:r>
-              <a:rPr lang="en-US" dirty="0"/>
-              <a:t/>
-            </a:r>
             <a:endParaRPr lang="en-US" dirty="0"/>
           </a:p>
         </p:txBody>
@@ -1823,6 +1865,11 @@
 <file path=ppt/slideMasters/slideMaster1.xml><?xml version="1.0" encoding="utf-8"?>
 <p:sldMaster xmlns:a="http://schemas.openxmlformats.org/drawingml/2006/main" xmlns:r="http://schemas.openxmlformats.org/officeDocument/2006/relationships" xmlns:p="http://schemas.openxmlformats.org/presentationml/2006/main">
   <p:cSld>
+    <p:bg>
+      <p:bgRef idx="1001">
+        <a:schemeClr val="bg1"/>
+      </p:bgRef>
+    </p:bg>
     <p:spTree>
       <p:nvGrpSpPr>
         <p:cNvPr id="1" name=""/>
@@ -2105,6 +2152,7 @@
         <a:solidFill>
           <a:srgbClr val="0A0E27"/>
         </a:solidFill>
+        <a:effectLst/>
       </p:bgPr>
     </p:bg>
     <p:spTree>
@@ -2414,7 +2462,7 @@
           <a:bodyPr wrap="square" rtlCol="0" anchor="ctr"/>
           <a:lstStyle/>
           <a:p>
-            <a:pPr indent="0" marL="0">
+            <a:pPr marL="0" indent="0">
               <a:buNone/>
             </a:pPr>
             <a:r>
@@ -2450,24 +2498,28 @@
           <a:ln/>
         </p:spPr>
         <p:txBody>
-          <a:bodyPr wrap="square" rtlCol="0" anchor="ctr"/>
-          <a:lstStyle/>
-          <a:p>
-            <a:pPr indent="0" marL="0">
-              <a:buNone/>
-            </a:pPr>
-            <a:r>
-              <a:rPr lang="en-US" sz="5200" b="1" dirty="0">
+          <a:bodyPr wrap="square" lIns="91440" tIns="45720" rIns="91440" bIns="45720" rtlCol="0" anchor="ctr"/>
+          <a:lstStyle/>
+          <a:p>
+            <a:pPr marL="0" indent="0">
+              <a:buNone/>
+            </a:pPr>
+            <a:r>
+              <a:rPr lang="en-US" sz="4000" b="1" dirty="0">
                 <a:solidFill>
                   <a:srgbClr val="00F5FF"/>
                 </a:solidFill>
-                <a:latin typeface="Arial" pitchFamily="34" charset="0"/>
-                <a:ea typeface="Arial" pitchFamily="34" charset="-122"/>
-                <a:cs typeface="Arial" pitchFamily="34" charset="-120"/>
+                <a:latin typeface="Arial"/>
+                <a:ea typeface="Arial" pitchFamily="34" charset="-122"/>
+                <a:cs typeface="Arial"/>
               </a:rPr>
               <a:t>SUPERPOWERS</a:t>
             </a:r>
-            <a:endParaRPr lang="en-US" sz="5200" dirty="0"/>
+            <a:endParaRPr lang="en-US" sz="4000">
+              <a:latin typeface="Arial"/>
+              <a:ea typeface="Calibri"/>
+              <a:cs typeface="Calibri"/>
+            </a:endParaRPr>
           </a:p>
         </p:txBody>
       </p:sp>
@@ -2517,11 +2569,11 @@
           <a:bodyPr wrap="square" rtlCol="0" anchor="ctr"/>
           <a:lstStyle/>
           <a:p>
-            <a:pPr indent="0" marL="0">
-              <a:buNone/>
-            </a:pPr>
-            <a:r>
-              <a:rPr lang="en-US" sz="2000" b="1" spc="800" kern="0" dirty="0">
+            <a:pPr marL="0" indent="0">
+              <a:buNone/>
+            </a:pPr>
+            <a:r>
+              <a:rPr lang="en-US" sz="2000" b="1" kern="0" spc="800" dirty="0">
                 <a:solidFill>
                   <a:srgbClr val="8892B0"/>
                 </a:solidFill>
@@ -2556,7 +2608,7 @@
           <a:bodyPr wrap="square" rtlCol="0" anchor="ctr"/>
           <a:lstStyle/>
           <a:p>
-            <a:pPr indent="0" marL="0">
+            <a:pPr marL="0" indent="0">
               <a:buNone/>
             </a:pPr>
             <a:r>
@@ -2595,7 +2647,7 @@
           <a:bodyPr wrap="square" rtlCol="0" anchor="ctr"/>
           <a:lstStyle/>
           <a:p>
-            <a:pPr indent="0" marL="0">
+            <a:pPr marL="0" indent="0">
               <a:buNone/>
             </a:pPr>
             <a:r>
@@ -2712,7 +2764,7 @@
           <a:bodyPr wrap="square" rtlCol="0" anchor="ctr"/>
           <a:lstStyle/>
           <a:p>
-            <a:pPr algn="ctr" indent="0" marL="0">
+            <a:pPr marL="0" indent="0" algn="ctr">
               <a:buNone/>
             </a:pPr>
             <a:r>
@@ -2751,7 +2803,7 @@
           <a:bodyPr wrap="square" rtlCol="0" anchor="ctr"/>
           <a:lstStyle/>
           <a:p>
-            <a:pPr algn="ctr" indent="0" marL="0">
+            <a:pPr marL="0" indent="0" algn="ctr">
               <a:buNone/>
             </a:pPr>
             <a:r>
@@ -2790,7 +2842,7 @@
           <a:bodyPr wrap="square" rtlCol="0" anchor="ctr"/>
           <a:lstStyle/>
           <a:p>
-            <a:pPr algn="ctr" indent="0" marL="0">
+            <a:pPr marL="0" indent="0" algn="ctr">
               <a:buNone/>
             </a:pPr>
             <a:r>
@@ -2907,7 +2959,7 @@
           <a:bodyPr wrap="square" rtlCol="0" anchor="ctr"/>
           <a:lstStyle/>
           <a:p>
-            <a:pPr algn="ctr" indent="0" marL="0">
+            <a:pPr marL="0" indent="0" algn="ctr">
               <a:buNone/>
             </a:pPr>
             <a:r>
@@ -2946,7 +2998,7 @@
           <a:bodyPr wrap="square" rtlCol="0" anchor="ctr"/>
           <a:lstStyle/>
           <a:p>
-            <a:pPr algn="ctr" indent="0" marL="0">
+            <a:pPr marL="0" indent="0" algn="ctr">
               <a:buNone/>
             </a:pPr>
             <a:r>
@@ -2985,7 +3037,7 @@
           <a:bodyPr wrap="square" rtlCol="0" anchor="ctr"/>
           <a:lstStyle/>
           <a:p>
-            <a:pPr algn="ctr" indent="0" marL="0">
+            <a:pPr marL="0" indent="0" algn="ctr">
               <a:buNone/>
             </a:pPr>
             <a:r>
@@ -3102,7 +3154,7 @@
           <a:bodyPr wrap="square" rtlCol="0" anchor="ctr"/>
           <a:lstStyle/>
           <a:p>
-            <a:pPr algn="ctr" indent="0" marL="0">
+            <a:pPr marL="0" indent="0" algn="ctr">
               <a:buNone/>
             </a:pPr>
             <a:r>
@@ -3141,7 +3193,7 @@
           <a:bodyPr wrap="square" rtlCol="0" anchor="ctr"/>
           <a:lstStyle/>
           <a:p>
-            <a:pPr algn="ctr" indent="0" marL="0">
+            <a:pPr marL="0" indent="0" algn="ctr">
               <a:buNone/>
             </a:pPr>
             <a:r>
@@ -3180,7 +3232,7 @@
           <a:bodyPr wrap="square" rtlCol="0" anchor="ctr"/>
           <a:lstStyle/>
           <a:p>
-            <a:pPr algn="ctr" indent="0" marL="0">
+            <a:pPr marL="0" indent="0" algn="ctr">
               <a:buNone/>
             </a:pPr>
             <a:r>
@@ -3297,7 +3349,7 @@
           <a:bodyPr wrap="square" rtlCol="0" anchor="ctr"/>
           <a:lstStyle/>
           <a:p>
-            <a:pPr algn="ctr" indent="0" marL="0">
+            <a:pPr marL="0" indent="0" algn="ctr">
               <a:buNone/>
             </a:pPr>
             <a:r>
@@ -3336,7 +3388,7 @@
           <a:bodyPr wrap="square" rtlCol="0" anchor="ctr"/>
           <a:lstStyle/>
           <a:p>
-            <a:pPr algn="ctr" indent="0" marL="0">
+            <a:pPr marL="0" indent="0" algn="ctr">
               <a:buNone/>
             </a:pPr>
             <a:r>
@@ -3375,7 +3427,7 @@
           <a:bodyPr wrap="square" rtlCol="0" anchor="ctr"/>
           <a:lstStyle/>
           <a:p>
-            <a:pPr algn="ctr" indent="0" marL="0">
+            <a:pPr marL="0" indent="0" algn="ctr">
               <a:buNone/>
             </a:pPr>
             <a:r>
@@ -3414,7 +3466,7 @@
           <a:bodyPr wrap="square" rtlCol="0" anchor="ctr"/>
           <a:lstStyle/>
           <a:p>
-            <a:pPr algn="ctr" indent="0" marL="0">
+            <a:pPr marL="0" indent="0" algn="ctr">
               <a:buNone/>
             </a:pPr>
             <a:r>
@@ -3448,6 +3500,7 @@
         <a:solidFill>
           <a:srgbClr val="0A0E27"/>
         </a:solidFill>
+        <a:effectLst/>
       </p:bgPr>
     </p:bg>
     <p:spTree>
@@ -3556,7 +3609,7 @@
           <a:bodyPr wrap="square" rtlCol="0" anchor="ctr"/>
           <a:lstStyle/>
           <a:p>
-            <a:pPr algn="ctr" indent="0" marL="0">
+            <a:pPr marL="0" indent="0" algn="ctr">
               <a:buNone/>
             </a:pPr>
             <a:r>
@@ -3595,7 +3648,7 @@
           <a:bodyPr wrap="square" rtlCol="0" anchor="ctr"/>
           <a:lstStyle/>
           <a:p>
-            <a:pPr indent="0" marL="0">
+            <a:pPr marL="0" indent="0">
               <a:buNone/>
             </a:pPr>
             <a:r>
@@ -3634,7 +3687,7 @@
           <a:bodyPr wrap="square" rtlCol="0" anchor="ctr"/>
           <a:lstStyle/>
           <a:p>
-            <a:pPr indent="0" marL="0">
+            <a:pPr marL="0" indent="0">
               <a:buNone/>
             </a:pPr>
             <a:r>
@@ -3673,7 +3726,7 @@
           <a:bodyPr wrap="square" rtlCol="0" anchor="ctr"/>
           <a:lstStyle/>
           <a:p>
-            <a:pPr indent="0" marL="0">
+            <a:pPr marL="0" indent="0">
               <a:buNone/>
             </a:pPr>
             <a:r>
@@ -3766,7 +3819,7 @@
           <a:bodyPr wrap="square" rtlCol="0" anchor="ctr"/>
           <a:lstStyle/>
           <a:p>
-            <a:pPr indent="0" marL="0">
+            <a:pPr marL="0" indent="0">
               <a:buNone/>
             </a:pPr>
             <a:r>
@@ -3805,7 +3858,7 @@
           <a:bodyPr wrap="square" rtlCol="0" anchor="ctr"/>
           <a:lstStyle/>
           <a:p>
-            <a:pPr indent="0" marL="0">
+            <a:pPr marL="0" indent="0">
               <a:buNone/>
             </a:pPr>
             <a:r>
@@ -3844,7 +3897,7 @@
           <a:bodyPr wrap="square" rtlCol="0" anchor="ctr"/>
           <a:lstStyle/>
           <a:p>
-            <a:pPr indent="0" marL="0">
+            <a:pPr marL="0" indent="0">
               <a:buNone/>
             </a:pPr>
             <a:r>
@@ -3907,7 +3960,7 @@
           <a:bodyPr wrap="square" rtlCol="0" anchor="ctr"/>
           <a:lstStyle/>
           <a:p>
-            <a:pPr indent="0" marL="0">
+            <a:pPr marL="0" indent="0">
               <a:buNone/>
             </a:pPr>
             <a:r>
@@ -3946,7 +3999,7 @@
           <a:bodyPr wrap="square" rtlCol="0" anchor="ctr"/>
           <a:lstStyle/>
           <a:p>
-            <a:pPr indent="0" marL="0">
+            <a:pPr marL="0" indent="0">
               <a:buNone/>
             </a:pPr>
             <a:r>
@@ -4009,7 +4062,7 @@
           <a:bodyPr wrap="square" rtlCol="0" anchor="ctr"/>
           <a:lstStyle/>
           <a:p>
-            <a:pPr indent="0" marL="0">
+            <a:pPr marL="0" indent="0">
               <a:buNone/>
             </a:pPr>
             <a:r>
@@ -4077,7 +4130,7 @@
           <a:bodyPr wrap="square" rtlCol="0" anchor="ctr"/>
           <a:lstStyle/>
           <a:p>
-            <a:pPr indent="0" marL="0">
+            <a:pPr marL="0" indent="0">
               <a:buNone/>
             </a:pPr>
             <a:r>
@@ -4116,7 +4169,7 @@
           <a:bodyPr wrap="square" rtlCol="0" anchor="ctr"/>
           <a:lstStyle/>
           <a:p>
-            <a:pPr indent="0" marL="0">
+            <a:pPr marL="0" indent="0">
               <a:buNone/>
             </a:pPr>
             <a:r>
@@ -4155,7 +4208,7 @@
           <a:bodyPr wrap="square" rtlCol="0" anchor="ctr"/>
           <a:lstStyle/>
           <a:p>
-            <a:pPr indent="0" marL="0">
+            <a:pPr marL="0" indent="0">
               <a:buNone/>
             </a:pPr>
             <a:r>
@@ -4218,7 +4271,7 @@
           <a:bodyPr wrap="square" rtlCol="0" anchor="ctr"/>
           <a:lstStyle/>
           <a:p>
-            <a:pPr indent="0" marL="0">
+            <a:pPr marL="0" indent="0">
               <a:buNone/>
             </a:pPr>
             <a:r>
@@ -4257,7 +4310,7 @@
           <a:bodyPr wrap="square" rtlCol="0" anchor="ctr"/>
           <a:lstStyle/>
           <a:p>
-            <a:pPr indent="0" marL="0">
+            <a:pPr marL="0" indent="0">
               <a:buNone/>
             </a:pPr>
             <a:r>
@@ -4320,7 +4373,7 @@
           <a:bodyPr wrap="square" rtlCol="0" anchor="ctr"/>
           <a:lstStyle/>
           <a:p>
-            <a:pPr indent="0" marL="0">
+            <a:pPr marL="0" indent="0">
               <a:buNone/>
             </a:pPr>
             <a:r>
@@ -4388,7 +4441,7 @@
           <a:bodyPr wrap="square" rtlCol="0" anchor="ctr"/>
           <a:lstStyle/>
           <a:p>
-            <a:pPr indent="0" marL="0">
+            <a:pPr marL="0" indent="0">
               <a:buNone/>
             </a:pPr>
             <a:r>
@@ -4427,7 +4480,7 @@
           <a:bodyPr wrap="square" rtlCol="0" anchor="ctr"/>
           <a:lstStyle/>
           <a:p>
-            <a:pPr indent="0" marL="0">
+            <a:pPr marL="0" indent="0">
               <a:buNone/>
             </a:pPr>
             <a:r>
@@ -4466,7 +4519,7 @@
           <a:bodyPr wrap="square" rtlCol="0" anchor="ctr"/>
           <a:lstStyle/>
           <a:p>
-            <a:pPr indent="0" marL="0">
+            <a:pPr marL="0" indent="0">
               <a:buNone/>
             </a:pPr>
             <a:r>
@@ -4529,7 +4582,7 @@
           <a:bodyPr wrap="square" rtlCol="0" anchor="ctr"/>
           <a:lstStyle/>
           <a:p>
-            <a:pPr indent="0" marL="0">
+            <a:pPr marL="0" indent="0">
               <a:buNone/>
             </a:pPr>
             <a:r>
@@ -4568,7 +4621,7 @@
           <a:bodyPr wrap="square" rtlCol="0" anchor="ctr"/>
           <a:lstStyle/>
           <a:p>
-            <a:pPr indent="0" marL="0">
+            <a:pPr marL="0" indent="0">
               <a:buNone/>
             </a:pPr>
             <a:r>
@@ -4631,7 +4684,7 @@
           <a:bodyPr wrap="square" rtlCol="0" anchor="ctr"/>
           <a:lstStyle/>
           <a:p>
-            <a:pPr indent="0" marL="0">
+            <a:pPr marL="0" indent="0">
               <a:buNone/>
             </a:pPr>
             <a:r>
@@ -4699,7 +4752,7 @@
           <a:bodyPr wrap="square" rtlCol="0" anchor="ctr"/>
           <a:lstStyle/>
           <a:p>
-            <a:pPr indent="0" marL="0">
+            <a:pPr marL="0" indent="0">
               <a:buNone/>
             </a:pPr>
             <a:r>
@@ -4738,7 +4791,7 @@
           <a:bodyPr wrap="square" rtlCol="0" anchor="ctr"/>
           <a:lstStyle/>
           <a:p>
-            <a:pPr indent="0" marL="0">
+            <a:pPr marL="0" indent="0">
               <a:buNone/>
             </a:pPr>
             <a:r>
@@ -4806,7 +4859,7 @@
           <a:bodyPr wrap="square" rtlCol="0" anchor="ctr"/>
           <a:lstStyle/>
           <a:p>
-            <a:pPr algn="ctr" indent="0" marL="0">
+            <a:pPr marL="0" indent="0" algn="ctr">
               <a:buNone/>
             </a:pPr>
             <a:r>
@@ -4845,7 +4898,7 @@
           <a:bodyPr wrap="square" rtlCol="0" anchor="ctr"/>
           <a:lstStyle/>
           <a:p>
-            <a:pPr indent="0" marL="0">
+            <a:pPr marL="0" indent="0">
               <a:buNone/>
             </a:pPr>
             <a:r>
@@ -4879,6 +4932,7 @@
         <a:solidFill>
           <a:srgbClr val="0A0E27"/>
         </a:solidFill>
+        <a:effectLst/>
       </p:bgPr>
     </p:bg>
     <p:spTree>
@@ -4987,7 +5041,7 @@
           <a:bodyPr wrap="square" rtlCol="0" anchor="ctr"/>
           <a:lstStyle/>
           <a:p>
-            <a:pPr algn="ctr" indent="0" marL="0">
+            <a:pPr marL="0" indent="0" algn="ctr">
               <a:buNone/>
             </a:pPr>
             <a:r>
@@ -5026,7 +5080,7 @@
           <a:bodyPr wrap="square" rtlCol="0" anchor="ctr"/>
           <a:lstStyle/>
           <a:p>
-            <a:pPr indent="0" marL="0">
+            <a:pPr marL="0" indent="0">
               <a:buNone/>
             </a:pPr>
             <a:r>
@@ -5065,7 +5119,7 @@
           <a:bodyPr wrap="square" rtlCol="0" anchor="ctr"/>
           <a:lstStyle/>
           <a:p>
-            <a:pPr indent="0" marL="0">
+            <a:pPr marL="0" indent="0">
               <a:buNone/>
             </a:pPr>
             <a:r>
@@ -5104,7 +5158,7 @@
           <a:bodyPr wrap="square" rtlCol="0" anchor="ctr"/>
           <a:lstStyle/>
           <a:p>
-            <a:pPr indent="0" marL="0">
+            <a:pPr marL="0" indent="0">
               <a:buNone/>
             </a:pPr>
             <a:r>
@@ -5197,7 +5251,7 @@
           <a:bodyPr wrap="square" rtlCol="0" anchor="ctr"/>
           <a:lstStyle/>
           <a:p>
-            <a:pPr indent="0" marL="0">
+            <a:pPr marL="0" indent="0">
               <a:buNone/>
             </a:pPr>
             <a:r>
@@ -5236,7 +5290,7 @@
           <a:bodyPr wrap="square" rtlCol="0" anchor="ctr"/>
           <a:lstStyle/>
           <a:p>
-            <a:pPr indent="0" marL="0">
+            <a:pPr marL="0" indent="0">
               <a:buNone/>
             </a:pPr>
             <a:r>
@@ -5275,7 +5329,7 @@
           <a:bodyPr wrap="square" rtlCol="0" anchor="ctr"/>
           <a:lstStyle/>
           <a:p>
-            <a:pPr indent="0" marL="0">
+            <a:pPr marL="0" indent="0">
               <a:buNone/>
             </a:pPr>
             <a:r>
@@ -5338,7 +5392,7 @@
           <a:bodyPr wrap="square" rtlCol="0" anchor="ctr"/>
           <a:lstStyle/>
           <a:p>
-            <a:pPr indent="0" marL="0">
+            <a:pPr marL="0" indent="0">
               <a:buNone/>
             </a:pPr>
             <a:r>
@@ -5377,7 +5431,7 @@
           <a:bodyPr wrap="square" rtlCol="0" anchor="ctr"/>
           <a:lstStyle/>
           <a:p>
-            <a:pPr indent="0" marL="0">
+            <a:pPr marL="0" indent="0">
               <a:buNone/>
             </a:pPr>
             <a:r>
@@ -5440,7 +5494,7 @@
           <a:bodyPr wrap="square" rtlCol="0" anchor="ctr"/>
           <a:lstStyle/>
           <a:p>
-            <a:pPr indent="0" marL="0">
+            <a:pPr marL="0" indent="0">
               <a:buNone/>
             </a:pPr>
             <a:r>
@@ -5508,7 +5562,7 @@
           <a:bodyPr wrap="square" rtlCol="0" anchor="ctr"/>
           <a:lstStyle/>
           <a:p>
-            <a:pPr indent="0" marL="0">
+            <a:pPr marL="0" indent="0">
               <a:buNone/>
             </a:pPr>
             <a:r>
@@ -5547,7 +5601,7 @@
           <a:bodyPr wrap="square" rtlCol="0" anchor="ctr"/>
           <a:lstStyle/>
           <a:p>
-            <a:pPr indent="0" marL="0">
+            <a:pPr marL="0" indent="0">
               <a:buNone/>
             </a:pPr>
             <a:r>
@@ -5586,7 +5640,7 @@
           <a:bodyPr wrap="square" rtlCol="0" anchor="ctr"/>
           <a:lstStyle/>
           <a:p>
-            <a:pPr indent="0" marL="0">
+            <a:pPr marL="0" indent="0">
               <a:buNone/>
             </a:pPr>
             <a:r>
@@ -5649,7 +5703,7 @@
           <a:bodyPr wrap="square" rtlCol="0" anchor="ctr"/>
           <a:lstStyle/>
           <a:p>
-            <a:pPr indent="0" marL="0">
+            <a:pPr marL="0" indent="0">
               <a:buNone/>
             </a:pPr>
             <a:r>
@@ -5688,7 +5742,7 @@
           <a:bodyPr wrap="square" rtlCol="0" anchor="ctr"/>
           <a:lstStyle/>
           <a:p>
-            <a:pPr indent="0" marL="0">
+            <a:pPr marL="0" indent="0">
               <a:buNone/>
             </a:pPr>
             <a:r>
@@ -5751,7 +5805,7 @@
           <a:bodyPr wrap="square" rtlCol="0" anchor="ctr"/>
           <a:lstStyle/>
           <a:p>
-            <a:pPr indent="0" marL="0">
+            <a:pPr marL="0" indent="0">
               <a:buNone/>
             </a:pPr>
             <a:r>
@@ -5819,7 +5873,7 @@
           <a:bodyPr wrap="square" rtlCol="0" anchor="ctr"/>
           <a:lstStyle/>
           <a:p>
-            <a:pPr indent="0" marL="0">
+            <a:pPr marL="0" indent="0">
               <a:buNone/>
             </a:pPr>
             <a:r>
@@ -5858,7 +5912,7 @@
           <a:bodyPr wrap="square" rtlCol="0" anchor="ctr"/>
           <a:lstStyle/>
           <a:p>
-            <a:pPr indent="0" marL="0">
+            <a:pPr marL="0" indent="0">
               <a:buNone/>
             </a:pPr>
             <a:r>
@@ -5897,7 +5951,7 @@
           <a:bodyPr wrap="square" rtlCol="0" anchor="ctr"/>
           <a:lstStyle/>
           <a:p>
-            <a:pPr indent="0" marL="0">
+            <a:pPr marL="0" indent="0">
               <a:buNone/>
             </a:pPr>
             <a:r>
@@ -5960,7 +6014,7 @@
           <a:bodyPr wrap="square" rtlCol="0" anchor="ctr"/>
           <a:lstStyle/>
           <a:p>
-            <a:pPr indent="0" marL="0">
+            <a:pPr marL="0" indent="0">
               <a:buNone/>
             </a:pPr>
             <a:r>
@@ -5999,7 +6053,7 @@
           <a:bodyPr wrap="square" rtlCol="0" anchor="ctr"/>
           <a:lstStyle/>
           <a:p>
-            <a:pPr indent="0" marL="0">
+            <a:pPr marL="0" indent="0">
               <a:buNone/>
             </a:pPr>
             <a:r>
@@ -6062,7 +6116,7 @@
           <a:bodyPr wrap="square" rtlCol="0" anchor="ctr"/>
           <a:lstStyle/>
           <a:p>
-            <a:pPr indent="0" marL="0">
+            <a:pPr marL="0" indent="0">
               <a:buNone/>
             </a:pPr>
             <a:r>
@@ -6130,7 +6184,7 @@
           <a:bodyPr wrap="square" rtlCol="0" anchor="ctr"/>
           <a:lstStyle/>
           <a:p>
-            <a:pPr indent="0" marL="0">
+            <a:pPr marL="0" indent="0">
               <a:buNone/>
             </a:pPr>
             <a:r>
@@ -6169,7 +6223,7 @@
           <a:bodyPr wrap="square" rtlCol="0" anchor="ctr"/>
           <a:lstStyle/>
           <a:p>
-            <a:pPr indent="0" marL="0">
+            <a:pPr marL="0" indent="0">
               <a:buNone/>
             </a:pPr>
             <a:r>
@@ -6237,7 +6291,7 @@
           <a:bodyPr wrap="square" rtlCol="0" anchor="ctr"/>
           <a:lstStyle/>
           <a:p>
-            <a:pPr algn="ctr" indent="0" marL="0">
+            <a:pPr marL="0" indent="0" algn="ctr">
               <a:buNone/>
             </a:pPr>
             <a:r>
@@ -6276,7 +6330,7 @@
           <a:bodyPr wrap="square" rtlCol="0" anchor="ctr"/>
           <a:lstStyle/>
           <a:p>
-            <a:pPr indent="0" marL="0">
+            <a:pPr marL="0" indent="0">
               <a:buNone/>
             </a:pPr>
             <a:r>
@@ -6310,6 +6364,7 @@
         <a:solidFill>
           <a:srgbClr val="0A0E27"/>
         </a:solidFill>
+        <a:effectLst/>
       </p:bgPr>
     </p:bg>
     <p:spTree>
@@ -6418,7 +6473,7 @@
           <a:bodyPr wrap="square" rtlCol="0" anchor="ctr"/>
           <a:lstStyle/>
           <a:p>
-            <a:pPr algn="ctr" indent="0" marL="0">
+            <a:pPr marL="0" indent="0" algn="ctr">
               <a:buNone/>
             </a:pPr>
             <a:r>
@@ -6457,7 +6512,7 @@
           <a:bodyPr wrap="square" rtlCol="0" anchor="ctr"/>
           <a:lstStyle/>
           <a:p>
-            <a:pPr indent="0" marL="0">
+            <a:pPr marL="0" indent="0">
               <a:buNone/>
             </a:pPr>
             <a:r>
@@ -6496,7 +6551,7 @@
           <a:bodyPr wrap="square" rtlCol="0" anchor="ctr"/>
           <a:lstStyle/>
           <a:p>
-            <a:pPr indent="0" marL="0">
+            <a:pPr marL="0" indent="0">
               <a:buNone/>
             </a:pPr>
             <a:r>
@@ -6535,7 +6590,7 @@
           <a:bodyPr wrap="square" rtlCol="0" anchor="ctr"/>
           <a:lstStyle/>
           <a:p>
-            <a:pPr indent="0" marL="0">
+            <a:pPr marL="0" indent="0">
               <a:buNone/>
             </a:pPr>
             <a:r>
@@ -6628,7 +6683,7 @@
           <a:bodyPr wrap="square" rtlCol="0" anchor="ctr"/>
           <a:lstStyle/>
           <a:p>
-            <a:pPr indent="0" marL="0">
+            <a:pPr marL="0" indent="0">
               <a:buNone/>
             </a:pPr>
             <a:r>
@@ -6667,7 +6722,7 @@
           <a:bodyPr wrap="square" rtlCol="0" anchor="ctr"/>
           <a:lstStyle/>
           <a:p>
-            <a:pPr indent="0" marL="0">
+            <a:pPr marL="0" indent="0">
               <a:buNone/>
             </a:pPr>
             <a:r>
@@ -6706,7 +6761,7 @@
           <a:bodyPr wrap="square" rtlCol="0" anchor="ctr"/>
           <a:lstStyle/>
           <a:p>
-            <a:pPr indent="0" marL="0">
+            <a:pPr marL="0" indent="0">
               <a:buNone/>
             </a:pPr>
             <a:r>
@@ -6769,7 +6824,7 @@
           <a:bodyPr wrap="square" rtlCol="0" anchor="ctr"/>
           <a:lstStyle/>
           <a:p>
-            <a:pPr indent="0" marL="0">
+            <a:pPr marL="0" indent="0">
               <a:buNone/>
             </a:pPr>
             <a:r>
@@ -6808,7 +6863,7 @@
           <a:bodyPr wrap="square" rtlCol="0" anchor="ctr"/>
           <a:lstStyle/>
           <a:p>
-            <a:pPr indent="0" marL="0">
+            <a:pPr marL="0" indent="0">
               <a:buNone/>
             </a:pPr>
             <a:r>
@@ -6871,7 +6926,7 @@
           <a:bodyPr wrap="square" rtlCol="0" anchor="ctr"/>
           <a:lstStyle/>
           <a:p>
-            <a:pPr indent="0" marL="0">
+            <a:pPr marL="0" indent="0">
               <a:buNone/>
             </a:pPr>
             <a:r>
@@ -6939,7 +6994,7 @@
           <a:bodyPr wrap="square" rtlCol="0" anchor="ctr"/>
           <a:lstStyle/>
           <a:p>
-            <a:pPr indent="0" marL="0">
+            <a:pPr marL="0" indent="0">
               <a:buNone/>
             </a:pPr>
             <a:r>
@@ -6978,7 +7033,7 @@
           <a:bodyPr wrap="square" rtlCol="0" anchor="ctr"/>
           <a:lstStyle/>
           <a:p>
-            <a:pPr indent="0" marL="0">
+            <a:pPr marL="0" indent="0">
               <a:buNone/>
             </a:pPr>
             <a:r>
@@ -7017,7 +7072,7 @@
           <a:bodyPr wrap="square" rtlCol="0" anchor="ctr"/>
           <a:lstStyle/>
           <a:p>
-            <a:pPr indent="0" marL="0">
+            <a:pPr marL="0" indent="0">
               <a:buNone/>
             </a:pPr>
             <a:r>
@@ -7080,7 +7135,7 @@
           <a:bodyPr wrap="square" rtlCol="0" anchor="ctr"/>
           <a:lstStyle/>
           <a:p>
-            <a:pPr indent="0" marL="0">
+            <a:pPr marL="0" indent="0">
               <a:buNone/>
             </a:pPr>
             <a:r>
@@ -7119,7 +7174,7 @@
           <a:bodyPr wrap="square" rtlCol="0" anchor="ctr"/>
           <a:lstStyle/>
           <a:p>
-            <a:pPr indent="0" marL="0">
+            <a:pPr marL="0" indent="0">
               <a:buNone/>
             </a:pPr>
             <a:r>
@@ -7182,7 +7237,7 @@
           <a:bodyPr wrap="square" rtlCol="0" anchor="ctr"/>
           <a:lstStyle/>
           <a:p>
-            <a:pPr indent="0" marL="0">
+            <a:pPr marL="0" indent="0">
               <a:buNone/>
             </a:pPr>
             <a:r>
@@ -7250,7 +7305,7 @@
           <a:bodyPr wrap="square" rtlCol="0" anchor="ctr"/>
           <a:lstStyle/>
           <a:p>
-            <a:pPr indent="0" marL="0">
+            <a:pPr marL="0" indent="0">
               <a:buNone/>
             </a:pPr>
             <a:r>
@@ -7289,7 +7344,7 @@
           <a:bodyPr wrap="square" rtlCol="0" anchor="ctr"/>
           <a:lstStyle/>
           <a:p>
-            <a:pPr indent="0" marL="0">
+            <a:pPr marL="0" indent="0">
               <a:buNone/>
             </a:pPr>
             <a:r>
@@ -7328,7 +7383,7 @@
           <a:bodyPr wrap="square" rtlCol="0" anchor="ctr"/>
           <a:lstStyle/>
           <a:p>
-            <a:pPr indent="0" marL="0">
+            <a:pPr marL="0" indent="0">
               <a:buNone/>
             </a:pPr>
             <a:r>
@@ -7391,7 +7446,7 @@
           <a:bodyPr wrap="square" rtlCol="0" anchor="ctr"/>
           <a:lstStyle/>
           <a:p>
-            <a:pPr indent="0" marL="0">
+            <a:pPr marL="0" indent="0">
               <a:buNone/>
             </a:pPr>
             <a:r>
@@ -7430,7 +7485,7 @@
           <a:bodyPr wrap="square" rtlCol="0" anchor="ctr"/>
           <a:lstStyle/>
           <a:p>
-            <a:pPr indent="0" marL="0">
+            <a:pPr marL="0" indent="0">
               <a:buNone/>
             </a:pPr>
             <a:r>
@@ -7493,7 +7548,7 @@
           <a:bodyPr wrap="square" rtlCol="0" anchor="ctr"/>
           <a:lstStyle/>
           <a:p>
-            <a:pPr indent="0" marL="0">
+            <a:pPr marL="0" indent="0">
               <a:buNone/>
             </a:pPr>
             <a:r>
@@ -7561,7 +7616,7 @@
           <a:bodyPr wrap="square" rtlCol="0" anchor="ctr"/>
           <a:lstStyle/>
           <a:p>
-            <a:pPr indent="0" marL="0">
+            <a:pPr marL="0" indent="0">
               <a:buNone/>
             </a:pPr>
             <a:r>
@@ -7600,7 +7655,7 @@
           <a:bodyPr wrap="square" rtlCol="0" anchor="ctr"/>
           <a:lstStyle/>
           <a:p>
-            <a:pPr indent="0" marL="0">
+            <a:pPr marL="0" indent="0">
               <a:buNone/>
             </a:pPr>
             <a:r>
@@ -7668,7 +7723,7 @@
           <a:bodyPr wrap="square" rtlCol="0" anchor="ctr"/>
           <a:lstStyle/>
           <a:p>
-            <a:pPr algn="ctr" indent="0" marL="0">
+            <a:pPr marL="0" indent="0" algn="ctr">
               <a:buNone/>
             </a:pPr>
             <a:r>
@@ -7707,7 +7762,7 @@
           <a:bodyPr wrap="square" rtlCol="0" anchor="ctr"/>
           <a:lstStyle/>
           <a:p>
-            <a:pPr indent="0" marL="0">
+            <a:pPr marL="0" indent="0">
               <a:buNone/>
             </a:pPr>
             <a:r>
@@ -7741,6 +7796,7 @@
         <a:solidFill>
           <a:srgbClr val="0A0E27"/>
         </a:solidFill>
+        <a:effectLst/>
       </p:bgPr>
     </p:bg>
     <p:spTree>
@@ -7849,7 +7905,7 @@
           <a:bodyPr wrap="square" rtlCol="0" anchor="ctr"/>
           <a:lstStyle/>
           <a:p>
-            <a:pPr algn="ctr" indent="0" marL="0">
+            <a:pPr marL="0" indent="0" algn="ctr">
               <a:buNone/>
             </a:pPr>
             <a:r>
@@ -7888,7 +7944,7 @@
           <a:bodyPr wrap="square" rtlCol="0" anchor="ctr"/>
           <a:lstStyle/>
           <a:p>
-            <a:pPr indent="0" marL="0">
+            <a:pPr marL="0" indent="0">
               <a:buNone/>
             </a:pPr>
             <a:r>
@@ -7927,7 +7983,7 @@
           <a:bodyPr wrap="square" rtlCol="0" anchor="ctr"/>
           <a:lstStyle/>
           <a:p>
-            <a:pPr indent="0" marL="0">
+            <a:pPr marL="0" indent="0">
               <a:buNone/>
             </a:pPr>
             <a:r>
@@ -7966,7 +8022,7 @@
           <a:bodyPr wrap="square" rtlCol="0" anchor="ctr"/>
           <a:lstStyle/>
           <a:p>
-            <a:pPr indent="0" marL="0">
+            <a:pPr marL="0" indent="0">
               <a:buNone/>
             </a:pPr>
             <a:r>
@@ -8059,7 +8115,7 @@
           <a:bodyPr wrap="square" rtlCol="0" anchor="ctr"/>
           <a:lstStyle/>
           <a:p>
-            <a:pPr indent="0" marL="0">
+            <a:pPr marL="0" indent="0">
               <a:buNone/>
             </a:pPr>
             <a:r>
@@ -8098,7 +8154,7 @@
           <a:bodyPr wrap="square" rtlCol="0" anchor="ctr"/>
           <a:lstStyle/>
           <a:p>
-            <a:pPr indent="0" marL="0">
+            <a:pPr marL="0" indent="0">
               <a:buNone/>
             </a:pPr>
             <a:r>
@@ -8137,7 +8193,7 @@
           <a:bodyPr wrap="square" rtlCol="0" anchor="ctr"/>
           <a:lstStyle/>
           <a:p>
-            <a:pPr indent="0" marL="0">
+            <a:pPr marL="0" indent="0">
               <a:buNone/>
             </a:pPr>
             <a:r>
@@ -8200,7 +8256,7 @@
           <a:bodyPr wrap="square" rtlCol="0" anchor="ctr"/>
           <a:lstStyle/>
           <a:p>
-            <a:pPr indent="0" marL="0">
+            <a:pPr marL="0" indent="0">
               <a:buNone/>
             </a:pPr>
             <a:r>
@@ -8239,7 +8295,7 @@
           <a:bodyPr wrap="square" rtlCol="0" anchor="ctr"/>
           <a:lstStyle/>
           <a:p>
-            <a:pPr indent="0" marL="0">
+            <a:pPr marL="0" indent="0">
               <a:buNone/>
             </a:pPr>
             <a:r>
@@ -8302,7 +8358,7 @@
           <a:bodyPr wrap="square" rtlCol="0" anchor="ctr"/>
           <a:lstStyle/>
           <a:p>
-            <a:pPr indent="0" marL="0">
+            <a:pPr marL="0" indent="0">
               <a:buNone/>
             </a:pPr>
             <a:r>
@@ -8370,7 +8426,7 @@
           <a:bodyPr wrap="square" rtlCol="0" anchor="ctr"/>
           <a:lstStyle/>
           <a:p>
-            <a:pPr indent="0" marL="0">
+            <a:pPr marL="0" indent="0">
               <a:buNone/>
             </a:pPr>
             <a:r>
@@ -8409,7 +8465,7 @@
           <a:bodyPr wrap="square" rtlCol="0" anchor="ctr"/>
           <a:lstStyle/>
           <a:p>
-            <a:pPr indent="0" marL="0">
+            <a:pPr marL="0" indent="0">
               <a:buNone/>
             </a:pPr>
             <a:r>
@@ -8448,7 +8504,7 @@
           <a:bodyPr wrap="square" rtlCol="0" anchor="ctr"/>
           <a:lstStyle/>
           <a:p>
-            <a:pPr indent="0" marL="0">
+            <a:pPr marL="0" indent="0">
               <a:buNone/>
             </a:pPr>
             <a:r>
@@ -8511,7 +8567,7 @@
           <a:bodyPr wrap="square" rtlCol="0" anchor="ctr"/>
           <a:lstStyle/>
           <a:p>
-            <a:pPr indent="0" marL="0">
+            <a:pPr marL="0" indent="0">
               <a:buNone/>
             </a:pPr>
             <a:r>
@@ -8550,7 +8606,7 @@
           <a:bodyPr wrap="square" rtlCol="0" anchor="ctr"/>
           <a:lstStyle/>
           <a:p>
-            <a:pPr indent="0" marL="0">
+            <a:pPr marL="0" indent="0">
               <a:buNone/>
             </a:pPr>
             <a:r>
@@ -8613,7 +8669,7 @@
           <a:bodyPr wrap="square" rtlCol="0" anchor="ctr"/>
           <a:lstStyle/>
           <a:p>
-            <a:pPr indent="0" marL="0">
+            <a:pPr marL="0" indent="0">
               <a:buNone/>
             </a:pPr>
             <a:r>
@@ -8681,7 +8737,7 @@
           <a:bodyPr wrap="square" rtlCol="0" anchor="ctr"/>
           <a:lstStyle/>
           <a:p>
-            <a:pPr indent="0" marL="0">
+            <a:pPr marL="0" indent="0">
               <a:buNone/>
             </a:pPr>
             <a:r>
@@ -8720,7 +8776,7 @@
           <a:bodyPr wrap="square" rtlCol="0" anchor="ctr"/>
           <a:lstStyle/>
           <a:p>
-            <a:pPr indent="0" marL="0">
+            <a:pPr marL="0" indent="0">
               <a:buNone/>
             </a:pPr>
             <a:r>
@@ -8759,7 +8815,7 @@
           <a:bodyPr wrap="square" rtlCol="0" anchor="ctr"/>
           <a:lstStyle/>
           <a:p>
-            <a:pPr indent="0" marL="0">
+            <a:pPr marL="0" indent="0">
               <a:buNone/>
             </a:pPr>
             <a:r>
@@ -8822,7 +8878,7 @@
           <a:bodyPr wrap="square" rtlCol="0" anchor="ctr"/>
           <a:lstStyle/>
           <a:p>
-            <a:pPr indent="0" marL="0">
+            <a:pPr marL="0" indent="0">
               <a:buNone/>
             </a:pPr>
             <a:r>
@@ -8861,7 +8917,7 @@
           <a:bodyPr wrap="square" rtlCol="0" anchor="ctr"/>
           <a:lstStyle/>
           <a:p>
-            <a:pPr indent="0" marL="0">
+            <a:pPr marL="0" indent="0">
               <a:buNone/>
             </a:pPr>
             <a:r>
@@ -8924,7 +8980,7 @@
           <a:bodyPr wrap="square" rtlCol="0" anchor="ctr"/>
           <a:lstStyle/>
           <a:p>
-            <a:pPr indent="0" marL="0">
+            <a:pPr marL="0" indent="0">
               <a:buNone/>
             </a:pPr>
             <a:r>
@@ -8992,7 +9048,7 @@
           <a:bodyPr wrap="square" rtlCol="0" anchor="ctr"/>
           <a:lstStyle/>
           <a:p>
-            <a:pPr indent="0" marL="0">
+            <a:pPr marL="0" indent="0">
               <a:buNone/>
             </a:pPr>
             <a:r>
@@ -9031,7 +9087,7 @@
           <a:bodyPr wrap="square" rtlCol="0" anchor="ctr"/>
           <a:lstStyle/>
           <a:p>
-            <a:pPr indent="0" marL="0">
+            <a:pPr marL="0" indent="0">
               <a:buNone/>
             </a:pPr>
             <a:r>
@@ -9099,7 +9155,7 @@
           <a:bodyPr wrap="square" rtlCol="0" anchor="ctr"/>
           <a:lstStyle/>
           <a:p>
-            <a:pPr algn="ctr" indent="0" marL="0">
+            <a:pPr marL="0" indent="0" algn="ctr">
               <a:buNone/>
             </a:pPr>
             <a:r>
@@ -9138,7 +9194,7 @@
           <a:bodyPr wrap="square" rtlCol="0" anchor="ctr"/>
           <a:lstStyle/>
           <a:p>
-            <a:pPr indent="0" marL="0">
+            <a:pPr marL="0" indent="0">
               <a:buNone/>
             </a:pPr>
             <a:r>
@@ -9172,6 +9228,7 @@
         <a:solidFill>
           <a:srgbClr val="0A0E27"/>
         </a:solidFill>
+        <a:effectLst/>
       </p:bgPr>
     </p:bg>
     <p:spTree>
@@ -9231,7 +9288,7 @@
           <a:bodyPr wrap="square" rtlCol="0" anchor="ctr"/>
           <a:lstStyle/>
           <a:p>
-            <a:pPr algn="ctr" indent="0" marL="0">
+            <a:pPr marL="0" indent="0" algn="ctr">
               <a:buNone/>
             </a:pPr>
             <a:r>
@@ -9267,7 +9324,7 @@
           <a:bodyPr wrap="square" rtlCol="0" anchor="ctr"/>
           <a:lstStyle/>
           <a:p>
-            <a:pPr algn="ctr" indent="0" marL="0">
+            <a:pPr marL="0" indent="0" algn="ctr">
               <a:buNone/>
             </a:pPr>
             <a:r>
@@ -9360,7 +9417,7 @@
           <a:bodyPr wrap="square" rtlCol="0" anchor="ctr"/>
           <a:lstStyle/>
           <a:p>
-            <a:pPr indent="0" marL="0">
+            <a:pPr marL="0" indent="0">
               <a:buNone/>
             </a:pPr>
             <a:r>
@@ -9419,7 +9476,7 @@
           <a:bodyPr wrap="square" rtlCol="0" anchor="ctr"/>
           <a:lstStyle/>
           <a:p>
-            <a:pPr algn="ctr" indent="0" marL="0">
+            <a:pPr marL="0" indent="0" algn="ctr">
               <a:buNone/>
             </a:pPr>
             <a:r>
@@ -9458,7 +9515,7 @@
           <a:bodyPr wrap="square" rtlCol="0" anchor="ctr"/>
           <a:lstStyle/>
           <a:p>
-            <a:pPr indent="0" marL="0">
+            <a:pPr marL="0" indent="0">
               <a:buNone/>
             </a:pPr>
             <a:r>
@@ -9517,7 +9574,7 @@
           <a:bodyPr wrap="square" rtlCol="0" anchor="ctr"/>
           <a:lstStyle/>
           <a:p>
-            <a:pPr algn="ctr" indent="0" marL="0">
+            <a:pPr marL="0" indent="0" algn="ctr">
               <a:buNone/>
             </a:pPr>
             <a:r>
@@ -9556,7 +9613,7 @@
           <a:bodyPr wrap="square" rtlCol="0" anchor="ctr"/>
           <a:lstStyle/>
           <a:p>
-            <a:pPr indent="0" marL="0">
+            <a:pPr marL="0" indent="0">
               <a:buNone/>
             </a:pPr>
             <a:r>
@@ -9615,7 +9672,7 @@
           <a:bodyPr wrap="square" rtlCol="0" anchor="ctr"/>
           <a:lstStyle/>
           <a:p>
-            <a:pPr algn="ctr" indent="0" marL="0">
+            <a:pPr marL="0" indent="0" algn="ctr">
               <a:buNone/>
             </a:pPr>
             <a:r>
@@ -9654,7 +9711,7 @@
           <a:bodyPr wrap="square" rtlCol="0" anchor="ctr"/>
           <a:lstStyle/>
           <a:p>
-            <a:pPr indent="0" marL="0">
+            <a:pPr marL="0" indent="0">
               <a:buNone/>
             </a:pPr>
             <a:r>
@@ -9722,7 +9779,7 @@
           <a:bodyPr wrap="square" rtlCol="0" anchor="ctr"/>
           <a:lstStyle/>
           <a:p>
-            <a:pPr algn="ctr" indent="0" marL="0">
+            <a:pPr marL="0" indent="0" algn="ctr">
               <a:buNone/>
             </a:pPr>
             <a:r>
@@ -9758,7 +9815,7 @@
           <a:bodyPr wrap="square" rtlCol="0" anchor="ctr"/>
           <a:lstStyle/>
           <a:p>
-            <a:pPr algn="ctr" indent="0" marL="0">
+            <a:pPr marL="0" indent="0" algn="ctr">
               <a:buNone/>
             </a:pPr>
             <a:r>
@@ -9797,7 +9854,7 @@
           <a:bodyPr wrap="square" rtlCol="0" anchor="ctr"/>
           <a:lstStyle/>
           <a:p>
-            <a:pPr algn="ctr" indent="0" marL="0">
+            <a:pPr marL="0" indent="0" algn="ctr">
               <a:buNone/>
             </a:pPr>
             <a:r>
@@ -9836,7 +9893,7 @@
           <a:bodyPr wrap="square" rtlCol="0" anchor="ctr"/>
           <a:lstStyle/>
           <a:p>
-            <a:pPr indent="0" marL="0">
+            <a:pPr marL="0" indent="0">
               <a:buNone/>
             </a:pPr>
             <a:r>
@@ -9895,7 +9952,7 @@
           <a:bodyPr wrap="square" rtlCol="0" anchor="ctr"/>
           <a:lstStyle/>
           <a:p>
-            <a:pPr indent="0" marL="0">
+            <a:pPr marL="0" indent="0">
               <a:buNone/>
             </a:pPr>
             <a:r>
@@ -9954,7 +10011,7 @@
           <a:bodyPr wrap="square" rtlCol="0" anchor="ctr"/>
           <a:lstStyle/>
           <a:p>
-            <a:pPr indent="0" marL="0">
+            <a:pPr marL="0" indent="0">
               <a:buNone/>
             </a:pPr>
             <a:r>
@@ -10013,7 +10070,7 @@
           <a:bodyPr wrap="square" rtlCol="0" anchor="ctr"/>
           <a:lstStyle/>
           <a:p>
-            <a:pPr indent="0" marL="0">
+            <a:pPr marL="0" indent="0">
               <a:buNone/>
             </a:pPr>
             <a:r>
@@ -10072,7 +10129,7 @@
           <a:bodyPr wrap="square" rtlCol="0" anchor="ctr"/>
           <a:lstStyle/>
           <a:p>
-            <a:pPr indent="0" marL="0">
+            <a:pPr marL="0" indent="0">
               <a:buNone/>
             </a:pPr>
             <a:r>
@@ -10106,6 +10163,7 @@
         <a:solidFill>
           <a:srgbClr val="0A0E27"/>
         </a:solidFill>
+        <a:effectLst/>
       </p:bgPr>
     </p:bg>
     <p:spTree>
@@ -10187,7 +10245,7 @@
           <a:bodyPr wrap="square" rtlCol="0" anchor="ctr"/>
           <a:lstStyle/>
           <a:p>
-            <a:pPr algn="ctr" indent="0" marL="0">
+            <a:pPr marL="0" indent="0" algn="ctr">
               <a:buNone/>
             </a:pPr>
             <a:r>
@@ -10226,7 +10284,7 @@
           <a:bodyPr wrap="square" rtlCol="0" anchor="ctr"/>
           <a:lstStyle/>
           <a:p>
-            <a:pPr algn="ctr" indent="0" marL="0">
+            <a:pPr marL="0" indent="0" algn="ctr">
               <a:buNone/>
             </a:pPr>
             <a:r>
@@ -10294,7 +10352,7 @@
           <a:bodyPr wrap="square" rtlCol="0" anchor="ctr"/>
           <a:lstStyle/>
           <a:p>
-            <a:pPr algn="ctr" indent="0" marL="0">
+            <a:pPr marL="0" indent="0" algn="ctr">
               <a:buNone/>
             </a:pPr>
             <a:r>
@@ -10362,7 +10420,7 @@
           <a:bodyPr wrap="square" rtlCol="0" anchor="ctr"/>
           <a:lstStyle/>
           <a:p>
-            <a:pPr algn="ctr" indent="0" marL="0">
+            <a:pPr marL="0" indent="0" algn="ctr">
               <a:buNone/>
             </a:pPr>
             <a:r>
@@ -10430,7 +10488,7 @@
           <a:bodyPr wrap="square" rtlCol="0" anchor="ctr"/>
           <a:lstStyle/>
           <a:p>
-            <a:pPr algn="ctr" indent="0" marL="0">
+            <a:pPr marL="0" indent="0" algn="ctr">
               <a:buNone/>
             </a:pPr>
             <a:r>
@@ -10498,7 +10556,7 @@
           <a:bodyPr wrap="square" rtlCol="0" anchor="ctr"/>
           <a:lstStyle/>
           <a:p>
-            <a:pPr algn="ctr" indent="0" marL="0">
+            <a:pPr marL="0" indent="0" algn="ctr">
               <a:buNone/>
             </a:pPr>
             <a:r>
@@ -10537,7 +10595,7 @@
           <a:bodyPr wrap="square" rtlCol="0" anchor="ctr"/>
           <a:lstStyle/>
           <a:p>
-            <a:pPr algn="ctr" indent="0" marL="0">
+            <a:pPr marL="0" indent="0" algn="ctr">
               <a:buNone/>
             </a:pPr>
             <a:r>
@@ -10576,7 +10634,7 @@
           <a:bodyPr wrap="square" rtlCol="0" anchor="ctr"/>
           <a:lstStyle/>
           <a:p>
-            <a:pPr algn="ctr" indent="0" marL="0">
+            <a:pPr marL="0" indent="0" algn="ctr">
               <a:buNone/>
             </a:pPr>
             <a:r>
@@ -10610,6 +10668,7 @@
         <a:solidFill>
           <a:srgbClr val="0A0E27"/>
         </a:solidFill>
+        <a:effectLst/>
       </p:bgPr>
     </p:bg>
     <p:spTree>
@@ -10691,7 +10750,7 @@
           <a:bodyPr wrap="square" rtlCol="0" anchor="ctr"/>
           <a:lstStyle/>
           <a:p>
-            <a:pPr indent="0" marL="0">
+            <a:pPr marL="0" indent="0">
               <a:buNone/>
             </a:pPr>
             <a:r>
@@ -10727,24 +10786,20 @@
           <a:ln/>
         </p:spPr>
         <p:txBody>
-          <a:bodyPr wrap="square" rtlCol="0" anchor="ctr"/>
-          <a:lstStyle/>
-          <a:p>
-            <a:pPr indent="0" marL="0">
-              <a:buNone/>
-            </a:pPr>
+          <a:bodyPr wrap="square" lIns="91440" tIns="45720" rIns="91440" bIns="45720" rtlCol="0" anchor="ctr"/>
+          <a:lstStyle/>
+          <a:p>
             <a:r>
               <a:rPr lang="en-US" sz="1100" b="1" dirty="0">
                 <a:solidFill>
                   <a:srgbClr val="00F5FF"/>
                 </a:solidFill>
-                <a:latin typeface="Arial" pitchFamily="34" charset="0"/>
-                <a:ea typeface="Arial" pitchFamily="34" charset="-122"/>
-                <a:cs typeface="Arial" pitchFamily="34" charset="-120"/>
-              </a:rPr>
-              <a:t>YOUR PATH TO AI FLUENCY</a:t>
-            </a:r>
-            <a:endParaRPr lang="en-US" sz="1100" dirty="0"/>
+                <a:latin typeface="Arial"/>
+                <a:cs typeface="Arial"/>
+              </a:rPr>
+              <a:t>How To Speak To AI</a:t>
+            </a:r>
+            <a:endParaRPr lang="en-US" dirty="0"/>
           </a:p>
         </p:txBody>
       </p:sp>
@@ -10820,7 +10875,7 @@
           <a:bodyPr wrap="square" rtlCol="0" anchor="ctr"/>
           <a:lstStyle/>
           <a:p>
-            <a:pPr algn="ctr" indent="0" marL="0">
+            <a:pPr marL="0" indent="0" algn="ctr">
               <a:buNone/>
             </a:pPr>
             <a:r>
@@ -10859,7 +10914,7 @@
           <a:bodyPr wrap="square" rtlCol="0" anchor="ctr"/>
           <a:lstStyle/>
           <a:p>
-            <a:pPr indent="0" marL="0">
+            <a:pPr marL="0" indent="0">
               <a:buNone/>
             </a:pPr>
             <a:r>
@@ -10898,7 +10953,7 @@
           <a:bodyPr wrap="square" rtlCol="0" anchor="ctr"/>
           <a:lstStyle/>
           <a:p>
-            <a:pPr indent="0" marL="0">
+            <a:pPr marL="0" indent="0">
               <a:buNone/>
             </a:pPr>
             <a:r>
@@ -10985,10 +11040,10 @@
           <a:ln/>
         </p:spPr>
         <p:txBody>
-          <a:bodyPr wrap="square" rtlCol="0" anchor="ctr"/>
-          <a:lstStyle/>
-          <a:p>
-            <a:pPr algn="ctr" indent="0" marL="0">
+          <a:bodyPr wrap="square" lIns="91440" tIns="45720" rIns="91440" bIns="45720" rtlCol="0" anchor="ctr"/>
+          <a:lstStyle/>
+          <a:p>
+            <a:pPr marL="0" indent="0" algn="ctr">
               <a:buNone/>
             </a:pPr>
             <a:r>
@@ -10996,13 +11051,15 @@
                 <a:solidFill>
                   <a:srgbClr val="0A0E27"/>
                 </a:solidFill>
-                <a:latin typeface="Arial" pitchFamily="34" charset="0"/>
-                <a:ea typeface="Arial" pitchFamily="34" charset="-122"/>
-                <a:cs typeface="Arial" pitchFamily="34" charset="-120"/>
-              </a:rPr>
-              <a:t>15 min</a:t>
-            </a:r>
-            <a:endParaRPr lang="en-US" sz="1100" dirty="0"/>
+                <a:latin typeface="Arial"/>
+                <a:cs typeface="Arial"/>
+              </a:rPr>
+              <a:t>5min</a:t>
+            </a:r>
+            <a:endParaRPr lang="en-US" sz="1100" dirty="0">
+              <a:latin typeface="Arial"/>
+              <a:cs typeface="Arial"/>
+            </a:endParaRPr>
           </a:p>
         </p:txBody>
       </p:sp>
@@ -11027,7 +11084,7 @@
           <a:bodyPr wrap="square" rtlCol="0" anchor="ctr"/>
           <a:lstStyle/>
           <a:p>
-            <a:pPr indent="0" marL="0">
+            <a:pPr marL="0" indent="0">
               <a:buNone/>
             </a:pPr>
             <a:r>
@@ -11066,7 +11123,7 @@
           <a:bodyPr wrap="square" rtlCol="0" anchor="ctr"/>
           <a:lstStyle/>
           <a:p>
-            <a:pPr indent="0" marL="0">
+            <a:pPr marL="0" indent="0">
               <a:buNone/>
             </a:pPr>
             <a:r>
@@ -11153,22 +11210,19 @@
           <a:ln/>
         </p:spPr>
         <p:txBody>
-          <a:bodyPr wrap="square" rtlCol="0" anchor="ctr"/>
-          <a:lstStyle/>
-          <a:p>
-            <a:pPr algn="ctr" indent="0" marL="0">
-              <a:buNone/>
-            </a:pPr>
+          <a:bodyPr wrap="square" lIns="91440" tIns="45720" rIns="91440" bIns="45720" rtlCol="0" anchor="ctr"/>
+          <a:lstStyle/>
+          <a:p>
+            <a:pPr algn="ctr"/>
             <a:r>
               <a:rPr lang="en-US" sz="1100" b="1" dirty="0">
                 <a:solidFill>
                   <a:srgbClr val="0A0E27"/>
                 </a:solidFill>
-                <a:latin typeface="Arial" pitchFamily="34" charset="0"/>
-                <a:ea typeface="Arial" pitchFamily="34" charset="-122"/>
-                <a:cs typeface="Arial" pitchFamily="34" charset="-120"/>
-              </a:rPr>
-              <a:t>80 min</a:t>
+                <a:latin typeface="Arial"/>
+                <a:cs typeface="Arial"/>
+              </a:rPr>
+              <a:t>60 min</a:t>
             </a:r>
             <a:endParaRPr lang="en-US" sz="1100" dirty="0"/>
           </a:p>
@@ -11195,7 +11249,7 @@
           <a:bodyPr wrap="square" rtlCol="0" anchor="ctr"/>
           <a:lstStyle/>
           <a:p>
-            <a:pPr indent="0" marL="0">
+            <a:pPr marL="0" indent="0">
               <a:buNone/>
             </a:pPr>
             <a:r>
@@ -11234,7 +11288,7 @@
           <a:bodyPr wrap="square" rtlCol="0" anchor="ctr"/>
           <a:lstStyle/>
           <a:p>
-            <a:pPr indent="0" marL="0">
+            <a:pPr marL="0" indent="0">
               <a:buNone/>
             </a:pPr>
             <a:r>
@@ -11324,7 +11378,7 @@
           <a:bodyPr wrap="square" rtlCol="0" anchor="ctr"/>
           <a:lstStyle/>
           <a:p>
-            <a:pPr algn="ctr" indent="0" marL="0">
+            <a:pPr marL="0" indent="0" algn="ctr">
               <a:buNone/>
             </a:pPr>
             <a:r>
@@ -11363,7 +11417,7 @@
           <a:bodyPr wrap="square" rtlCol="0" anchor="ctr"/>
           <a:lstStyle/>
           <a:p>
-            <a:pPr indent="0" marL="0">
+            <a:pPr marL="0" indent="0">
               <a:buNone/>
             </a:pPr>
             <a:r>
@@ -11402,7 +11456,7 @@
           <a:bodyPr wrap="square" rtlCol="0" anchor="ctr"/>
           <a:lstStyle/>
           <a:p>
-            <a:pPr indent="0" marL="0">
+            <a:pPr marL="0" indent="0">
               <a:buNone/>
             </a:pPr>
             <a:r>
@@ -11490,7 +11544,7 @@
           <a:bodyPr wrap="square" rtlCol="0" anchor="ctr"/>
           <a:lstStyle/>
           <a:p>
-            <a:pPr indent="0" marL="0">
+            <a:pPr marL="0" indent="0">
               <a:buNone/>
             </a:pPr>
             <a:r>
@@ -11529,7 +11583,7 @@
           <a:bodyPr wrap="square" rtlCol="0" anchor="ctr"/>
           <a:lstStyle/>
           <a:p>
-            <a:pPr indent="0" marL="0">
+            <a:pPr marL="0" indent="0">
               <a:buNone/>
             </a:pPr>
             <a:r>
@@ -11565,10 +11619,10 @@
           <a:ln/>
         </p:spPr>
         <p:txBody>
-          <a:bodyPr wrap="square" rtlCol="0" anchor="ctr"/>
-          <a:lstStyle/>
-          <a:p>
-            <a:pPr indent="0" marL="0">
+          <a:bodyPr wrap="square" lIns="91440" tIns="45720" rIns="91440" bIns="45720" rtlCol="0" anchor="ctr"/>
+          <a:lstStyle/>
+          <a:p>
+            <a:pPr marL="0" indent="0">
               <a:buNone/>
             </a:pPr>
             <a:r>
@@ -11576,13 +11630,16 @@
                 <a:solidFill>
                   <a:srgbClr val="E0E6ED"/>
                 </a:solidFill>
-                <a:latin typeface="Arial" pitchFamily="34" charset="0"/>
-                <a:ea typeface="Arial" pitchFamily="34" charset="-122"/>
-                <a:cs typeface="Arial" pitchFamily="34" charset="-120"/>
-              </a:rPr>
-              <a:t>• 14 min hands-on practice</a:t>
-            </a:r>
-            <a:endParaRPr lang="en-US" sz="1200" dirty="0"/>
+                <a:latin typeface="Arial"/>
+                <a:ea typeface="Arial" pitchFamily="34" charset="-122"/>
+                <a:cs typeface="Arial"/>
+              </a:rPr>
+              <a:t>• 10 min hands-on practice</a:t>
+            </a:r>
+            <a:endParaRPr lang="en-US" sz="1200" dirty="0">
+              <a:latin typeface="Arial"/>
+              <a:cs typeface="Arial"/>
+            </a:endParaRPr>
           </a:p>
         </p:txBody>
       </p:sp>
@@ -11607,7 +11664,7 @@
           <a:bodyPr wrap="square" rtlCol="0" anchor="ctr"/>
           <a:lstStyle/>
           <a:p>
-            <a:pPr indent="0" marL="0">
+            <a:pPr marL="0" indent="0">
               <a:buNone/>
             </a:pPr>
             <a:r>
@@ -11643,24 +11700,24 @@
           <a:ln/>
         </p:spPr>
         <p:txBody>
-          <a:bodyPr wrap="square" rtlCol="0" anchor="ctr"/>
-          <a:lstStyle/>
-          <a:p>
-            <a:pPr indent="0" marL="0">
-              <a:buNone/>
-            </a:pPr>
+          <a:bodyPr wrap="square" lIns="91440" tIns="45720" rIns="91440" bIns="45720" rtlCol="0" anchor="ctr"/>
+          <a:lstStyle/>
+          <a:p>
             <a:r>
               <a:rPr lang="en-US" sz="1200" dirty="0">
                 <a:solidFill>
                   <a:srgbClr val="E0E6ED"/>
                 </a:solidFill>
-                <a:latin typeface="Arial" pitchFamily="34" charset="0"/>
-                <a:ea typeface="Arial" pitchFamily="34" charset="-122"/>
-                <a:cs typeface="Arial" pitchFamily="34" charset="-120"/>
-              </a:rPr>
-              <a:t>• 5 min share back with group</a:t>
-            </a:r>
-            <a:endParaRPr lang="en-US" sz="1200" dirty="0"/>
+                <a:latin typeface="Arial"/>
+                <a:ea typeface="Arial" pitchFamily="34" charset="-122"/>
+                <a:cs typeface="Arial"/>
+              </a:rPr>
+              <a:t>• 4 min share back with group</a:t>
+            </a:r>
+            <a:endParaRPr lang="en-US" sz="1200" dirty="0">
+              <a:latin typeface="Arial"/>
+              <a:cs typeface="Arial"/>
+            </a:endParaRPr>
           </a:p>
         </p:txBody>
       </p:sp>
@@ -11708,7 +11765,7 @@
           <a:bodyPr wrap="square" rtlCol="0" anchor="ctr"/>
           <a:lstStyle/>
           <a:p>
-            <a:pPr indent="0" marL="0">
+            <a:pPr marL="0" indent="0">
               <a:buNone/>
             </a:pPr>
             <a:r>
@@ -11742,6 +11799,7 @@
         <a:solidFill>
           <a:srgbClr val="0A0E27"/>
         </a:solidFill>
+        <a:effectLst/>
       </p:bgPr>
     </p:bg>
     <p:spTree>
@@ -11823,7 +11881,7 @@
           <a:bodyPr wrap="square" rtlCol="0" anchor="ctr"/>
           <a:lstStyle/>
           <a:p>
-            <a:pPr algn="ctr" indent="0" marL="0">
+            <a:pPr marL="0" indent="0" algn="ctr">
               <a:buNone/>
             </a:pPr>
             <a:r>
@@ -11859,7 +11917,7 @@
           <a:bodyPr wrap="square" rtlCol="0" anchor="ctr"/>
           <a:lstStyle/>
           <a:p>
-            <a:pPr algn="ctr" indent="0" marL="0">
+            <a:pPr marL="0" indent="0" algn="ctr">
               <a:buNone/>
             </a:pPr>
             <a:r>
@@ -11898,7 +11956,7 @@
           <a:bodyPr wrap="square" rtlCol="0" anchor="ctr"/>
           <a:lstStyle/>
           <a:p>
-            <a:pPr algn="ctr" indent="0" marL="0">
+            <a:pPr marL="0" indent="0" algn="ctr">
               <a:buNone/>
             </a:pPr>
             <a:r>
@@ -11925,7 +11983,7 @@
         <p:spPr>
           <a:xfrm>
             <a:off x="1371600" y="2651760"/>
-            <a:ext cx="6400800" cy="1645920"/>
+            <a:ext cx="6400800" cy="2201091"/>
           </a:xfrm>
           <a:prstGeom prst="roundRect">
             <a:avLst>
@@ -11966,7 +12024,7 @@
           <a:bodyPr wrap="square" rtlCol="0" anchor="ctr"/>
           <a:lstStyle/>
           <a:p>
-            <a:pPr indent="0" marL="0">
+            <a:pPr marL="0" indent="0">
               <a:buNone/>
             </a:pPr>
             <a:r>
@@ -12005,7 +12063,7 @@
           <a:bodyPr wrap="square" rtlCol="0" anchor="ctr"/>
           <a:lstStyle/>
           <a:p>
-            <a:pPr indent="0" marL="0">
+            <a:pPr marL="0" indent="0">
               <a:buNone/>
             </a:pPr>
             <a:r>
@@ -12044,7 +12102,7 @@
           <a:bodyPr wrap="square" rtlCol="0" anchor="ctr"/>
           <a:lstStyle/>
           <a:p>
-            <a:pPr indent="0" marL="0">
+            <a:pPr marL="0" indent="0">
               <a:buNone/>
             </a:pPr>
             <a:r>
@@ -12083,7 +12141,7 @@
           <a:bodyPr wrap="square" rtlCol="0" anchor="ctr"/>
           <a:lstStyle/>
           <a:p>
-            <a:pPr indent="0" marL="0">
+            <a:pPr marL="0" indent="0">
               <a:buNone/>
             </a:pPr>
             <a:r>
@@ -12122,7 +12180,7 @@
           <a:bodyPr wrap="square" rtlCol="0" anchor="ctr"/>
           <a:lstStyle/>
           <a:p>
-            <a:pPr indent="0" marL="0">
+            <a:pPr marL="0" indent="0">
               <a:buNone/>
             </a:pPr>
             <a:r>
@@ -12161,7 +12219,7 @@
           <a:bodyPr wrap="square" rtlCol="0" anchor="ctr"/>
           <a:lstStyle/>
           <a:p>
-            <a:pPr indent="0" marL="0">
+            <a:pPr marL="0" indent="0">
               <a:buNone/>
             </a:pPr>
             <a:r>
@@ -12195,6 +12253,7 @@
         <a:solidFill>
           <a:srgbClr val="0A0E27"/>
         </a:solidFill>
+        <a:effectLst/>
       </p:bgPr>
     </p:bg>
     <p:spTree>
@@ -12276,7 +12335,7 @@
           <a:bodyPr wrap="square" rtlCol="0" anchor="ctr"/>
           <a:lstStyle/>
           <a:p>
-            <a:pPr indent="0" marL="0">
+            <a:pPr marL="0" indent="0">
               <a:buNone/>
             </a:pPr>
             <a:r>
@@ -12315,7 +12374,7 @@
           <a:bodyPr wrap="square" rtlCol="0" anchor="ctr"/>
           <a:lstStyle/>
           <a:p>
-            <a:pPr indent="0" marL="0">
+            <a:pPr marL="0" indent="0">
               <a:buNone/>
             </a:pPr>
             <a:r>
@@ -12408,7 +12467,7 @@
           <a:bodyPr wrap="square" rtlCol="0" anchor="ctr"/>
           <a:lstStyle/>
           <a:p>
-            <a:pPr indent="0" marL="0">
+            <a:pPr marL="0" indent="0">
               <a:buNone/>
             </a:pPr>
             <a:r>
@@ -12444,7 +12503,7 @@
           <a:bodyPr wrap="square" rtlCol="0" anchor="ctr"/>
           <a:lstStyle/>
           <a:p>
-            <a:pPr indent="0" marL="0">
+            <a:pPr marL="0" indent="0">
               <a:buNone/>
             </a:pPr>
             <a:r>
@@ -12483,7 +12542,7 @@
           <a:bodyPr wrap="square" rtlCol="0" anchor="ctr"/>
           <a:lstStyle/>
           <a:p>
-            <a:pPr indent="0" marL="0">
+            <a:pPr marL="0" indent="0">
               <a:buNone/>
             </a:pPr>
             <a:r>
@@ -12551,7 +12610,7 @@
           <a:bodyPr wrap="square" rtlCol="0" anchor="ctr"/>
           <a:lstStyle/>
           <a:p>
-            <a:pPr indent="0" marL="0">
+            <a:pPr marL="0" indent="0">
               <a:buNone/>
             </a:pPr>
             <a:r>
@@ -12587,7 +12646,7 @@
           <a:bodyPr wrap="square" rtlCol="0" anchor="ctr"/>
           <a:lstStyle/>
           <a:p>
-            <a:pPr indent="0" marL="0">
+            <a:pPr marL="0" indent="0">
               <a:buNone/>
             </a:pPr>
             <a:r>
@@ -12626,7 +12685,7 @@
           <a:bodyPr wrap="square" rtlCol="0" anchor="ctr"/>
           <a:lstStyle/>
           <a:p>
-            <a:pPr indent="0" marL="0">
+            <a:pPr marL="0" indent="0">
               <a:buNone/>
             </a:pPr>
             <a:r>
@@ -12694,7 +12753,7 @@
           <a:bodyPr wrap="square" rtlCol="0" anchor="ctr"/>
           <a:lstStyle/>
           <a:p>
-            <a:pPr indent="0" marL="0">
+            <a:pPr marL="0" indent="0">
               <a:buNone/>
             </a:pPr>
             <a:r>
@@ -12730,7 +12789,7 @@
           <a:bodyPr wrap="square" rtlCol="0" anchor="ctr"/>
           <a:lstStyle/>
           <a:p>
-            <a:pPr indent="0" marL="0">
+            <a:pPr marL="0" indent="0">
               <a:buNone/>
             </a:pPr>
             <a:r>
@@ -12769,7 +12828,7 @@
           <a:bodyPr wrap="square" rtlCol="0" anchor="ctr"/>
           <a:lstStyle/>
           <a:p>
-            <a:pPr indent="0" marL="0">
+            <a:pPr marL="0" indent="0">
               <a:buNone/>
             </a:pPr>
             <a:r>
@@ -12837,7 +12896,7 @@
           <a:bodyPr wrap="square" rtlCol="0" anchor="ctr"/>
           <a:lstStyle/>
           <a:p>
-            <a:pPr indent="0" marL="0">
+            <a:pPr marL="0" indent="0">
               <a:buNone/>
             </a:pPr>
             <a:r>
@@ -12873,7 +12932,7 @@
           <a:bodyPr wrap="square" rtlCol="0" anchor="ctr"/>
           <a:lstStyle/>
           <a:p>
-            <a:pPr indent="0" marL="0">
+            <a:pPr marL="0" indent="0">
               <a:buNone/>
             </a:pPr>
             <a:r>
@@ -12912,7 +12971,7 @@
           <a:bodyPr wrap="square" rtlCol="0" anchor="ctr"/>
           <a:lstStyle/>
           <a:p>
-            <a:pPr indent="0" marL="0">
+            <a:pPr marL="0" indent="0">
               <a:buNone/>
             </a:pPr>
             <a:r>
@@ -12980,7 +13039,7 @@
           <a:bodyPr wrap="square" rtlCol="0" anchor="ctr"/>
           <a:lstStyle/>
           <a:p>
-            <a:pPr indent="0" marL="0">
+            <a:pPr marL="0" indent="0">
               <a:buNone/>
             </a:pPr>
             <a:r>
@@ -13016,7 +13075,7 @@
           <a:bodyPr wrap="square" rtlCol="0" anchor="ctr"/>
           <a:lstStyle/>
           <a:p>
-            <a:pPr indent="0" marL="0">
+            <a:pPr marL="0" indent="0">
               <a:buNone/>
             </a:pPr>
             <a:r>
@@ -13055,7 +13114,7 @@
           <a:bodyPr wrap="square" rtlCol="0" anchor="ctr"/>
           <a:lstStyle/>
           <a:p>
-            <a:pPr indent="0" marL="0">
+            <a:pPr marL="0" indent="0">
               <a:buNone/>
             </a:pPr>
             <a:r>
@@ -13123,7 +13182,7 @@
           <a:bodyPr wrap="square" rtlCol="0" anchor="ctr"/>
           <a:lstStyle/>
           <a:p>
-            <a:pPr indent="0" marL="0">
+            <a:pPr marL="0" indent="0">
               <a:buNone/>
             </a:pPr>
             <a:r>
@@ -13159,7 +13218,7 @@
           <a:bodyPr wrap="square" rtlCol="0" anchor="ctr"/>
           <a:lstStyle/>
           <a:p>
-            <a:pPr indent="0" marL="0">
+            <a:pPr marL="0" indent="0">
               <a:buNone/>
             </a:pPr>
             <a:r>
@@ -13198,7 +13257,7 @@
           <a:bodyPr wrap="square" rtlCol="0" anchor="ctr"/>
           <a:lstStyle/>
           <a:p>
-            <a:pPr indent="0" marL="0">
+            <a:pPr marL="0" indent="0">
               <a:buNone/>
             </a:pPr>
             <a:r>
@@ -13232,6 +13291,7 @@
         <a:solidFill>
           <a:srgbClr val="0A0E27"/>
         </a:solidFill>
+        <a:effectLst/>
       </p:bgPr>
     </p:bg>
     <p:spTree>
@@ -13291,7 +13351,7 @@
           <a:bodyPr wrap="square" rtlCol="0" anchor="ctr"/>
           <a:lstStyle/>
           <a:p>
-            <a:pPr indent="0" marL="0">
+            <a:pPr marL="0" indent="0">
               <a:buNone/>
             </a:pPr>
             <a:r>
@@ -13327,7 +13387,7 @@
           <a:bodyPr wrap="square" rtlCol="0" anchor="ctr"/>
           <a:lstStyle/>
           <a:p>
-            <a:pPr indent="0" marL="0">
+            <a:pPr marL="0" indent="0">
               <a:buNone/>
             </a:pPr>
             <a:r>
@@ -13440,7 +13500,7 @@
           <a:bodyPr wrap="square" rtlCol="0" anchor="ctr"/>
           <a:lstStyle/>
           <a:p>
-            <a:pPr algn="ctr" indent="0" marL="0">
+            <a:pPr marL="0" indent="0" algn="ctr">
               <a:buNone/>
             </a:pPr>
             <a:r>
@@ -13479,7 +13539,7 @@
           <a:bodyPr wrap="square" rtlCol="0" anchor="ctr"/>
           <a:lstStyle/>
           <a:p>
-            <a:pPr indent="0" marL="0">
+            <a:pPr marL="0" indent="0">
               <a:buNone/>
             </a:pPr>
             <a:r>
@@ -13518,7 +13578,7 @@
           <a:bodyPr wrap="square" rtlCol="0" anchor="ctr"/>
           <a:lstStyle/>
           <a:p>
-            <a:pPr indent="0" marL="0">
+            <a:pPr marL="0" indent="0">
               <a:buNone/>
             </a:pPr>
             <a:r>
@@ -13606,7 +13666,7 @@
           <a:bodyPr wrap="square" rtlCol="0" anchor="ctr"/>
           <a:lstStyle/>
           <a:p>
-            <a:pPr algn="ctr" indent="0" marL="0">
+            <a:pPr marL="0" indent="0" algn="ctr">
               <a:buNone/>
             </a:pPr>
             <a:r>
@@ -13645,7 +13705,7 @@
           <a:bodyPr wrap="square" rtlCol="0" anchor="ctr"/>
           <a:lstStyle/>
           <a:p>
-            <a:pPr indent="0" marL="0">
+            <a:pPr marL="0" indent="0">
               <a:buNone/>
             </a:pPr>
             <a:r>
@@ -13733,7 +13793,7 @@
           <a:bodyPr wrap="square" rtlCol="0" anchor="ctr"/>
           <a:lstStyle/>
           <a:p>
-            <a:pPr algn="ctr" indent="0" marL="0">
+            <a:pPr marL="0" indent="0" algn="ctr">
               <a:buNone/>
             </a:pPr>
             <a:r>
@@ -13772,7 +13832,7 @@
           <a:bodyPr wrap="square" rtlCol="0" anchor="ctr"/>
           <a:lstStyle/>
           <a:p>
-            <a:pPr indent="0" marL="0">
+            <a:pPr marL="0" indent="0">
               <a:buNone/>
             </a:pPr>
             <a:r>
@@ -13840,7 +13900,7 @@
           <a:bodyPr wrap="square" rtlCol="0" anchor="ctr"/>
           <a:lstStyle/>
           <a:p>
-            <a:pPr algn="ctr" indent="0" marL="0">
+            <a:pPr marL="0" indent="0" algn="ctr">
               <a:buNone/>
             </a:pPr>
             <a:r>
@@ -13876,7 +13936,7 @@
           <a:bodyPr wrap="square" rtlCol="0" anchor="ctr"/>
           <a:lstStyle/>
           <a:p>
-            <a:pPr algn="ctr" indent="0" marL="0">
+            <a:pPr marL="0" indent="0" algn="ctr">
               <a:buNone/>
             </a:pPr>
             <a:r>
@@ -13915,7 +13975,7 @@
           <a:bodyPr wrap="square" rtlCol="0" anchor="ctr"/>
           <a:lstStyle/>
           <a:p>
-            <a:pPr algn="ctr" indent="0" marL="0">
+            <a:pPr marL="0" indent="0" algn="ctr">
               <a:buNone/>
             </a:pPr>
             <a:r>
@@ -13949,6 +14009,7 @@
         <a:solidFill>
           <a:srgbClr val="0A0E27"/>
         </a:solidFill>
+        <a:effectLst/>
       </p:bgPr>
     </p:bg>
     <p:spTree>
@@ -14030,7 +14091,7 @@
           <a:bodyPr wrap="square" rtlCol="0" anchor="ctr"/>
           <a:lstStyle/>
           <a:p>
-            <a:pPr algn="ctr" indent="0" marL="0">
+            <a:pPr marL="0" indent="0" algn="ctr">
               <a:buNone/>
             </a:pPr>
             <a:r>
@@ -14196,7 +14257,7 @@
           <a:bodyPr wrap="square" rtlCol="0" anchor="ctr"/>
           <a:lstStyle/>
           <a:p>
-            <a:pPr algn="ctr" indent="0" marL="0">
+            <a:pPr marL="0" indent="0" algn="ctr">
               <a:buNone/>
             </a:pPr>
             <a:r>
@@ -14235,7 +14296,7 @@
           <a:bodyPr wrap="square" rtlCol="0" anchor="ctr"/>
           <a:lstStyle/>
           <a:p>
-            <a:pPr algn="ctr" indent="0" marL="0">
+            <a:pPr marL="0" indent="0" algn="ctr">
               <a:buNone/>
             </a:pPr>
             <a:r>
@@ -14271,7 +14332,7 @@
           <a:bodyPr wrap="square" rtlCol="0" anchor="ctr"/>
           <a:lstStyle/>
           <a:p>
-            <a:pPr algn="ctr" indent="0" marL="0">
+            <a:pPr marL="0" indent="0" algn="ctr">
               <a:lnSpc>
                 <a:spcPts val="1400"/>
               </a:lnSpc>
@@ -14291,7 +14352,7 @@
             <a:endParaRPr lang="en-US" sz="1200" dirty="0"/>
           </a:p>
           <a:p>
-            <a:pPr algn="ctr" indent="0" marL="0">
+            <a:pPr marL="0" indent="0" algn="ctr">
               <a:lnSpc>
                 <a:spcPts val="1400"/>
               </a:lnSpc>
@@ -14333,7 +14394,7 @@
           <a:bodyPr wrap="square" rtlCol="0" anchor="ctr"/>
           <a:lstStyle/>
           <a:p>
-            <a:pPr algn="ctr" indent="0" marL="0">
+            <a:pPr marL="0" indent="0" algn="ctr">
               <a:buNone/>
             </a:pPr>
             <a:r>
@@ -14474,7 +14535,7 @@
           <a:bodyPr wrap="square" rtlCol="0" anchor="ctr"/>
           <a:lstStyle/>
           <a:p>
-            <a:pPr algn="ctr" indent="0" marL="0">
+            <a:pPr marL="0" indent="0" algn="ctr">
               <a:buNone/>
             </a:pPr>
             <a:r>
@@ -14513,7 +14574,7 @@
           <a:bodyPr wrap="square" rtlCol="0" anchor="ctr"/>
           <a:lstStyle/>
           <a:p>
-            <a:pPr algn="ctr" indent="0" marL="0">
+            <a:pPr marL="0" indent="0" algn="ctr">
               <a:buNone/>
             </a:pPr>
             <a:r>
@@ -14549,7 +14610,7 @@
           <a:bodyPr wrap="square" rtlCol="0" anchor="ctr"/>
           <a:lstStyle/>
           <a:p>
-            <a:pPr algn="ctr" indent="0" marL="0">
+            <a:pPr marL="0" indent="0" algn="ctr">
               <a:lnSpc>
                 <a:spcPts val="1400"/>
               </a:lnSpc>
@@ -14569,7 +14630,7 @@
             <a:endParaRPr lang="en-US" sz="1200" dirty="0"/>
           </a:p>
           <a:p>
-            <a:pPr algn="ctr" indent="0" marL="0">
+            <a:pPr marL="0" indent="0" algn="ctr">
               <a:lnSpc>
                 <a:spcPts val="1400"/>
               </a:lnSpc>
@@ -14611,7 +14672,7 @@
           <a:bodyPr wrap="square" rtlCol="0" anchor="ctr"/>
           <a:lstStyle/>
           <a:p>
-            <a:pPr algn="ctr" indent="0" marL="0">
+            <a:pPr marL="0" indent="0" algn="ctr">
               <a:buNone/>
             </a:pPr>
             <a:r>
@@ -14752,7 +14813,7 @@
           <a:bodyPr wrap="square" rtlCol="0" anchor="ctr"/>
           <a:lstStyle/>
           <a:p>
-            <a:pPr algn="ctr" indent="0" marL="0">
+            <a:pPr marL="0" indent="0" algn="ctr">
               <a:buNone/>
             </a:pPr>
             <a:r>
@@ -14791,7 +14852,7 @@
           <a:bodyPr wrap="square" rtlCol="0" anchor="ctr"/>
           <a:lstStyle/>
           <a:p>
-            <a:pPr algn="ctr" indent="0" marL="0">
+            <a:pPr marL="0" indent="0" algn="ctr">
               <a:buNone/>
             </a:pPr>
             <a:r>
@@ -14827,7 +14888,7 @@
           <a:bodyPr wrap="square" rtlCol="0" anchor="ctr"/>
           <a:lstStyle/>
           <a:p>
-            <a:pPr algn="ctr" indent="0" marL="0">
+            <a:pPr marL="0" indent="0" algn="ctr">
               <a:lnSpc>
                 <a:spcPts val="1400"/>
               </a:lnSpc>
@@ -14847,7 +14908,7 @@
             <a:endParaRPr lang="en-US" sz="1200" dirty="0"/>
           </a:p>
           <a:p>
-            <a:pPr algn="ctr" indent="0" marL="0">
+            <a:pPr marL="0" indent="0" algn="ctr">
               <a:lnSpc>
                 <a:spcPts val="1400"/>
               </a:lnSpc>
@@ -14889,7 +14950,7 @@
           <a:bodyPr wrap="square" rtlCol="0" anchor="ctr"/>
           <a:lstStyle/>
           <a:p>
-            <a:pPr algn="ctr" indent="0" marL="0">
+            <a:pPr marL="0" indent="0" algn="ctr">
               <a:buNone/>
             </a:pPr>
             <a:r>
@@ -15030,7 +15091,7 @@
           <a:bodyPr wrap="square" rtlCol="0" anchor="ctr"/>
           <a:lstStyle/>
           <a:p>
-            <a:pPr algn="ctr" indent="0" marL="0">
+            <a:pPr marL="0" indent="0" algn="ctr">
               <a:buNone/>
             </a:pPr>
             <a:r>
@@ -15069,7 +15130,7 @@
           <a:bodyPr wrap="square" rtlCol="0" anchor="ctr"/>
           <a:lstStyle/>
           <a:p>
-            <a:pPr algn="ctr" indent="0" marL="0">
+            <a:pPr marL="0" indent="0" algn="ctr">
               <a:buNone/>
             </a:pPr>
             <a:r>
@@ -15105,7 +15166,7 @@
           <a:bodyPr wrap="square" rtlCol="0" anchor="ctr"/>
           <a:lstStyle/>
           <a:p>
-            <a:pPr algn="ctr" indent="0" marL="0">
+            <a:pPr marL="0" indent="0" algn="ctr">
               <a:lnSpc>
                 <a:spcPts val="1400"/>
               </a:lnSpc>
@@ -15125,7 +15186,7 @@
             <a:endParaRPr lang="en-US" sz="1200" dirty="0"/>
           </a:p>
           <a:p>
-            <a:pPr algn="ctr" indent="0" marL="0">
+            <a:pPr marL="0" indent="0" algn="ctr">
               <a:lnSpc>
                 <a:spcPts val="1400"/>
               </a:lnSpc>
@@ -15167,7 +15228,7 @@
           <a:bodyPr wrap="square" rtlCol="0" anchor="ctr"/>
           <a:lstStyle/>
           <a:p>
-            <a:pPr algn="ctr" indent="0" marL="0">
+            <a:pPr marL="0" indent="0" algn="ctr">
               <a:buNone/>
             </a:pPr>
             <a:r>
@@ -15235,7 +15296,7 @@
           <a:bodyPr wrap="square" rtlCol="0" anchor="ctr"/>
           <a:lstStyle/>
           <a:p>
-            <a:pPr indent="0" marL="0">
+            <a:pPr marL="0" indent="0">
               <a:buNone/>
             </a:pPr>
             <a:r>
@@ -15274,7 +15335,7 @@
           <a:bodyPr wrap="square" rtlCol="0" anchor="ctr"/>
           <a:lstStyle/>
           <a:p>
-            <a:pPr indent="0" marL="0">
+            <a:pPr marL="0" indent="0">
               <a:buNone/>
             </a:pPr>
             <a:r>
@@ -15313,7 +15374,7 @@
           <a:bodyPr wrap="square" rtlCol="0" anchor="ctr"/>
           <a:lstStyle/>
           <a:p>
-            <a:pPr indent="0" marL="0">
+            <a:pPr marL="0" indent="0">
               <a:buNone/>
             </a:pPr>
             <a:r>
@@ -15352,7 +15413,7 @@
           <a:bodyPr wrap="square" rtlCol="0" anchor="ctr"/>
           <a:lstStyle/>
           <a:p>
-            <a:pPr indent="0" marL="0">
+            <a:pPr marL="0" indent="0">
               <a:buNone/>
             </a:pPr>
             <a:r>
@@ -15391,7 +15452,7 @@
           <a:bodyPr wrap="square" rtlCol="0" anchor="ctr"/>
           <a:lstStyle/>
           <a:p>
-            <a:pPr indent="0" marL="0">
+            <a:pPr marL="0" indent="0">
               <a:buNone/>
             </a:pPr>
             <a:r>
@@ -15430,7 +15491,7 @@
           <a:bodyPr wrap="square" rtlCol="0" anchor="ctr"/>
           <a:lstStyle/>
           <a:p>
-            <a:pPr indent="0" marL="0">
+            <a:pPr marL="0" indent="0">
               <a:buNone/>
             </a:pPr>
             <a:r>
@@ -15464,6 +15525,7 @@
         <a:solidFill>
           <a:srgbClr val="0A0E27"/>
         </a:solidFill>
+        <a:effectLst/>
       </p:bgPr>
     </p:bg>
     <p:spTree>
@@ -15545,7 +15607,7 @@
           <a:bodyPr wrap="square" rtlCol="0" anchor="ctr"/>
           <a:lstStyle/>
           <a:p>
-            <a:pPr indent="0" marL="0">
+            <a:pPr marL="0" indent="0">
               <a:buNone/>
             </a:pPr>
             <a:r>
@@ -15584,7 +15646,7 @@
           <a:bodyPr wrap="square" rtlCol="0" anchor="ctr"/>
           <a:lstStyle/>
           <a:p>
-            <a:pPr indent="0" marL="0">
+            <a:pPr marL="0" indent="0">
               <a:buNone/>
             </a:pPr>
             <a:r>
@@ -15623,7 +15685,7 @@
           <a:bodyPr wrap="square" rtlCol="0" anchor="ctr"/>
           <a:lstStyle/>
           <a:p>
-            <a:pPr algn="ctr" indent="0" marL="0">
+            <a:pPr marL="0" indent="0" algn="ctr">
               <a:buNone/>
             </a:pPr>
             <a:r>
@@ -15686,7 +15748,7 @@
           <a:bodyPr wrap="square" rtlCol="0" anchor="ctr"/>
           <a:lstStyle/>
           <a:p>
-            <a:pPr indent="0" marL="0">
+            <a:pPr marL="0" indent="0">
               <a:buNone/>
             </a:pPr>
             <a:r>
@@ -15725,7 +15787,7 @@
           <a:bodyPr wrap="square" rtlCol="0" anchor="ctr"/>
           <a:lstStyle/>
           <a:p>
-            <a:pPr indent="0" marL="0">
+            <a:pPr marL="0" indent="0">
               <a:buNone/>
             </a:pPr>
             <a:r>
@@ -15764,7 +15826,7 @@
           <a:bodyPr wrap="square" rtlCol="0" anchor="ctr"/>
           <a:lstStyle/>
           <a:p>
-            <a:pPr indent="0" marL="0">
+            <a:pPr marL="0" indent="0">
               <a:buNone/>
             </a:pPr>
             <a:r>
@@ -15828,7 +15890,7 @@
           <a:bodyPr wrap="square" rtlCol="0" anchor="ctr"/>
           <a:lstStyle/>
           <a:p>
-            <a:pPr indent="0" marL="0">
+            <a:pPr marL="0" indent="0">
               <a:buNone/>
             </a:pPr>
             <a:r>
@@ -15867,7 +15929,7 @@
           <a:bodyPr wrap="square" rtlCol="0" anchor="ctr"/>
           <a:lstStyle/>
           <a:p>
-            <a:pPr algn="ctr" indent="0" marL="0">
+            <a:pPr marL="0" indent="0" algn="ctr">
               <a:buNone/>
             </a:pPr>
             <a:r>
@@ -15930,7 +15992,7 @@
           <a:bodyPr wrap="square" rtlCol="0" anchor="ctr"/>
           <a:lstStyle/>
           <a:p>
-            <a:pPr indent="0" marL="0">
+            <a:pPr marL="0" indent="0">
               <a:buNone/>
             </a:pPr>
             <a:r>
@@ -15969,7 +16031,7 @@
           <a:bodyPr wrap="square" rtlCol="0" anchor="ctr"/>
           <a:lstStyle/>
           <a:p>
-            <a:pPr indent="0" marL="0">
+            <a:pPr marL="0" indent="0">
               <a:buNone/>
             </a:pPr>
             <a:r>
@@ -16008,7 +16070,7 @@
           <a:bodyPr wrap="square" rtlCol="0" anchor="ctr"/>
           <a:lstStyle/>
           <a:p>
-            <a:pPr indent="0" marL="0">
+            <a:pPr marL="0" indent="0">
               <a:buNone/>
             </a:pPr>
             <a:r>
@@ -16072,7 +16134,7 @@
           <a:bodyPr wrap="square" rtlCol="0" anchor="ctr"/>
           <a:lstStyle/>
           <a:p>
-            <a:pPr indent="0" marL="0">
+            <a:pPr marL="0" indent="0">
               <a:buNone/>
             </a:pPr>
             <a:r>
@@ -16111,7 +16173,7 @@
           <a:bodyPr wrap="square" rtlCol="0" anchor="ctr"/>
           <a:lstStyle/>
           <a:p>
-            <a:pPr algn="ctr" indent="0" marL="0">
+            <a:pPr marL="0" indent="0" algn="ctr">
               <a:buNone/>
             </a:pPr>
             <a:r>
@@ -16174,7 +16236,7 @@
           <a:bodyPr wrap="square" rtlCol="0" anchor="ctr"/>
           <a:lstStyle/>
           <a:p>
-            <a:pPr indent="0" marL="0">
+            <a:pPr marL="0" indent="0">
               <a:buNone/>
             </a:pPr>
             <a:r>
@@ -16213,7 +16275,7 @@
           <a:bodyPr wrap="square" rtlCol="0" anchor="ctr"/>
           <a:lstStyle/>
           <a:p>
-            <a:pPr indent="0" marL="0">
+            <a:pPr marL="0" indent="0">
               <a:buNone/>
             </a:pPr>
             <a:r>
@@ -16252,7 +16314,7 @@
           <a:bodyPr wrap="square" rtlCol="0" anchor="ctr"/>
           <a:lstStyle/>
           <a:p>
-            <a:pPr indent="0" marL="0">
+            <a:pPr marL="0" indent="0">
               <a:buNone/>
             </a:pPr>
             <a:r>
@@ -16316,7 +16378,7 @@
           <a:bodyPr wrap="square" rtlCol="0" anchor="ctr"/>
           <a:lstStyle/>
           <a:p>
-            <a:pPr indent="0" marL="0">
+            <a:pPr marL="0" indent="0">
               <a:buNone/>
             </a:pPr>
             <a:r>
@@ -16355,7 +16417,7 @@
           <a:bodyPr wrap="square" rtlCol="0" anchor="ctr"/>
           <a:lstStyle/>
           <a:p>
-            <a:pPr algn="ctr" indent="0" marL="0">
+            <a:pPr marL="0" indent="0" algn="ctr">
               <a:buNone/>
             </a:pPr>
             <a:r>
@@ -16418,7 +16480,7 @@
           <a:bodyPr wrap="square" rtlCol="0" anchor="ctr"/>
           <a:lstStyle/>
           <a:p>
-            <a:pPr indent="0" marL="0">
+            <a:pPr marL="0" indent="0">
               <a:buNone/>
             </a:pPr>
             <a:r>
@@ -16457,7 +16519,7 @@
           <a:bodyPr wrap="square" rtlCol="0" anchor="ctr"/>
           <a:lstStyle/>
           <a:p>
-            <a:pPr indent="0" marL="0">
+            <a:pPr marL="0" indent="0">
               <a:buNone/>
             </a:pPr>
             <a:r>
@@ -16496,7 +16558,7 @@
           <a:bodyPr wrap="square" rtlCol="0" anchor="ctr"/>
           <a:lstStyle/>
           <a:p>
-            <a:pPr indent="0" marL="0">
+            <a:pPr marL="0" indent="0">
               <a:buNone/>
             </a:pPr>
             <a:r>
@@ -16560,7 +16622,7 @@
           <a:bodyPr wrap="square" rtlCol="0" anchor="ctr"/>
           <a:lstStyle/>
           <a:p>
-            <a:pPr indent="0" marL="0">
+            <a:pPr marL="0" indent="0">
               <a:buNone/>
             </a:pPr>
             <a:r>
@@ -16599,7 +16661,7 @@
           <a:bodyPr wrap="square" rtlCol="0" anchor="ctr"/>
           <a:lstStyle/>
           <a:p>
-            <a:pPr algn="ctr" indent="0" marL="0">
+            <a:pPr marL="0" indent="0" algn="ctr">
               <a:buNone/>
             </a:pPr>
             <a:r>
@@ -16662,7 +16724,7 @@
           <a:bodyPr wrap="square" rtlCol="0" anchor="ctr"/>
           <a:lstStyle/>
           <a:p>
-            <a:pPr indent="0" marL="0">
+            <a:pPr marL="0" indent="0">
               <a:buNone/>
             </a:pPr>
             <a:r>
@@ -16701,7 +16763,7 @@
           <a:bodyPr wrap="square" rtlCol="0" anchor="ctr"/>
           <a:lstStyle/>
           <a:p>
-            <a:pPr indent="0" marL="0">
+            <a:pPr marL="0" indent="0">
               <a:buNone/>
             </a:pPr>
             <a:r>
@@ -16740,7 +16802,7 @@
           <a:bodyPr wrap="square" rtlCol="0" anchor="ctr"/>
           <a:lstStyle/>
           <a:p>
-            <a:pPr indent="0" marL="0">
+            <a:pPr marL="0" indent="0">
               <a:buNone/>
             </a:pPr>
             <a:r>
@@ -16804,7 +16866,7 @@
           <a:bodyPr wrap="square" rtlCol="0" anchor="ctr"/>
           <a:lstStyle/>
           <a:p>
-            <a:pPr indent="0" marL="0">
+            <a:pPr marL="0" indent="0">
               <a:buNone/>
             </a:pPr>
             <a:r>
@@ -16838,6 +16900,7 @@
         <a:solidFill>
           <a:srgbClr val="0A0E27"/>
         </a:solidFill>
+        <a:effectLst/>
       </p:bgPr>
     </p:bg>
     <p:spTree>
@@ -16919,7 +16982,7 @@
           <a:bodyPr wrap="square" rtlCol="0" anchor="ctr"/>
           <a:lstStyle/>
           <a:p>
-            <a:pPr algn="ctr" indent="0" marL="0">
+            <a:pPr marL="0" indent="0" algn="ctr">
               <a:buNone/>
             </a:pPr>
             <a:r>
@@ -17012,7 +17075,7 @@
           <a:bodyPr wrap="square" rtlCol="0" anchor="ctr"/>
           <a:lstStyle/>
           <a:p>
-            <a:pPr indent="0" marL="0">
+            <a:pPr marL="0" indent="0">
               <a:buNone/>
             </a:pPr>
             <a:r>
@@ -17073,7 +17136,7 @@
           <a:bodyPr wrap="square" rtlCol="0" anchor="ctr"/>
           <a:lstStyle/>
           <a:p>
-            <a:pPr indent="0" marL="0">
+            <a:pPr marL="0" indent="0">
               <a:buNone/>
             </a:pPr>
             <a:r>
@@ -17112,7 +17175,7 @@
           <a:bodyPr wrap="square" rtlCol="0" anchor="ctr"/>
           <a:lstStyle/>
           <a:p>
-            <a:pPr indent="0" marL="0">
+            <a:pPr marL="0" indent="0">
               <a:buNone/>
             </a:pPr>
             <a:r>
@@ -17151,7 +17214,7 @@
           <a:bodyPr wrap="square" rtlCol="0" anchor="ctr"/>
           <a:lstStyle/>
           <a:p>
-            <a:pPr indent="0" marL="0">
+            <a:pPr marL="0" indent="0">
               <a:buNone/>
             </a:pPr>
             <a:r>
@@ -17168,7 +17231,7 @@
             <a:endParaRPr lang="en-US" sz="1100" dirty="0"/>
           </a:p>
           <a:p>
-            <a:pPr indent="0" marL="0">
+            <a:pPr marL="0" indent="0">
               <a:buNone/>
             </a:pPr>
             <a:r>
@@ -17236,7 +17299,7 @@
           <a:bodyPr wrap="square" rtlCol="0" anchor="ctr"/>
           <a:lstStyle/>
           <a:p>
-            <a:pPr indent="0" marL="0">
+            <a:pPr marL="0" indent="0">
               <a:buNone/>
             </a:pPr>
             <a:r>
@@ -17297,7 +17360,7 @@
           <a:bodyPr wrap="square" rtlCol="0" anchor="ctr"/>
           <a:lstStyle/>
           <a:p>
-            <a:pPr indent="0" marL="0">
+            <a:pPr marL="0" indent="0">
               <a:buNone/>
             </a:pPr>
             <a:r>
@@ -17336,7 +17399,7 @@
           <a:bodyPr wrap="square" rtlCol="0" anchor="ctr"/>
           <a:lstStyle/>
           <a:p>
-            <a:pPr indent="0" marL="0">
+            <a:pPr marL="0" indent="0">
               <a:buNone/>
             </a:pPr>
             <a:r>
@@ -17375,7 +17438,7 @@
           <a:bodyPr wrap="square" rtlCol="0" anchor="ctr"/>
           <a:lstStyle/>
           <a:p>
-            <a:pPr indent="0" marL="0">
+            <a:pPr marL="0" indent="0">
               <a:buNone/>
             </a:pPr>
             <a:r>
@@ -17443,7 +17506,7 @@
           <a:bodyPr wrap="square" rtlCol="0" anchor="ctr"/>
           <a:lstStyle/>
           <a:p>
-            <a:pPr algn="ctr" indent="0" marL="0">
+            <a:pPr marL="0" indent="0" algn="ctr">
               <a:buNone/>
             </a:pPr>
             <a:r>
@@ -17460,7 +17523,7 @@
             <a:endParaRPr lang="en-US" sz="1300" dirty="0"/>
           </a:p>
           <a:p>
-            <a:pPr algn="ctr" indent="0" marL="0">
+            <a:pPr marL="0" indent="0" algn="ctr">
               <a:buNone/>
             </a:pPr>
             <a:r>
@@ -17528,7 +17591,7 @@
           <a:bodyPr wrap="square" rtlCol="0" anchor="ctr"/>
           <a:lstStyle/>
           <a:p>
-            <a:pPr algn="ctr" indent="0" marL="0">
+            <a:pPr marL="0" indent="0" algn="ctr">
               <a:buNone/>
             </a:pPr>
             <a:r>
@@ -17545,7 +17608,7 @@
             <a:endParaRPr lang="en-US" sz="1300" dirty="0"/>
           </a:p>
           <a:p>
-            <a:pPr algn="ctr" indent="0" marL="0">
+            <a:pPr marL="0" indent="0" algn="ctr">
               <a:buNone/>
             </a:pPr>
             <a:r>
@@ -17579,6 +17642,7 @@
         <a:solidFill>
           <a:srgbClr val="0A0E27"/>
         </a:solidFill>
+        <a:effectLst/>
       </p:bgPr>
     </p:bg>
     <p:spTree>
@@ -17638,7 +17702,7 @@
           <a:bodyPr wrap="square" rtlCol="0" anchor="ctr"/>
           <a:lstStyle/>
           <a:p>
-            <a:pPr algn="ctr" indent="0" marL="0">
+            <a:pPr marL="0" indent="0" algn="ctr">
               <a:buNone/>
             </a:pPr>
             <a:r>
@@ -17674,7 +17738,7 @@
           <a:bodyPr wrap="square" rtlCol="0" anchor="ctr"/>
           <a:lstStyle/>
           <a:p>
-            <a:pPr algn="ctr" indent="0" marL="0">
+            <a:pPr marL="0" indent="0" algn="ctr">
               <a:buNone/>
             </a:pPr>
             <a:r>
@@ -17713,7 +17777,7 @@
           <a:bodyPr wrap="square" rtlCol="0" anchor="ctr"/>
           <a:lstStyle/>
           <a:p>
-            <a:pPr algn="ctr" indent="0" marL="0">
+            <a:pPr marL="0" indent="0" algn="ctr">
               <a:buNone/>
             </a:pPr>
             <a:r>
@@ -17806,7 +17870,7 @@
           <a:bodyPr wrap="square" rtlCol="0" anchor="ctr"/>
           <a:lstStyle/>
           <a:p>
-            <a:pPr indent="0" marL="0">
+            <a:pPr marL="0" indent="0">
               <a:buNone/>
             </a:pPr>
             <a:r>
@@ -17865,7 +17929,7 @@
           <a:bodyPr wrap="square" rtlCol="0" anchor="ctr"/>
           <a:lstStyle/>
           <a:p>
-            <a:pPr algn="ctr" indent="0" marL="0">
+            <a:pPr marL="0" indent="0" algn="ctr">
               <a:buNone/>
             </a:pPr>
             <a:r>
@@ -17904,7 +17968,7 @@
           <a:bodyPr wrap="square" rtlCol="0" anchor="ctr"/>
           <a:lstStyle/>
           <a:p>
-            <a:pPr indent="0" marL="0">
+            <a:pPr marL="0" indent="0">
               <a:buNone/>
             </a:pPr>
             <a:r>
@@ -17963,7 +18027,7 @@
           <a:bodyPr wrap="square" rtlCol="0" anchor="ctr"/>
           <a:lstStyle/>
           <a:p>
-            <a:pPr algn="ctr" indent="0" marL="0">
+            <a:pPr marL="0" indent="0" algn="ctr">
               <a:buNone/>
             </a:pPr>
             <a:r>
@@ -18002,7 +18066,7 @@
           <a:bodyPr wrap="square" rtlCol="0" anchor="ctr"/>
           <a:lstStyle/>
           <a:p>
-            <a:pPr indent="0" marL="0">
+            <a:pPr marL="0" indent="0">
               <a:buNone/>
             </a:pPr>
             <a:r>
@@ -18061,7 +18125,7 @@
           <a:bodyPr wrap="square" rtlCol="0" anchor="ctr"/>
           <a:lstStyle/>
           <a:p>
-            <a:pPr algn="ctr" indent="0" marL="0">
+            <a:pPr marL="0" indent="0" algn="ctr">
               <a:buNone/>
             </a:pPr>
             <a:r>
@@ -18100,7 +18164,7 @@
           <a:bodyPr wrap="square" rtlCol="0" anchor="ctr"/>
           <a:lstStyle/>
           <a:p>
-            <a:pPr indent="0" marL="0">
+            <a:pPr marL="0" indent="0">
               <a:buNone/>
             </a:pPr>
             <a:r>
@@ -18159,7 +18223,7 @@
           <a:bodyPr wrap="square" rtlCol="0" anchor="ctr"/>
           <a:lstStyle/>
           <a:p>
-            <a:pPr algn="ctr" indent="0" marL="0">
+            <a:pPr marL="0" indent="0" algn="ctr">
               <a:buNone/>
             </a:pPr>
             <a:r>
@@ -18198,7 +18262,7 @@
           <a:bodyPr wrap="square" rtlCol="0" anchor="ctr"/>
           <a:lstStyle/>
           <a:p>
-            <a:pPr indent="0" marL="0">
+            <a:pPr marL="0" indent="0">
               <a:buNone/>
             </a:pPr>
             <a:r>
@@ -18266,7 +18330,7 @@
           <a:bodyPr wrap="square" rtlCol="0" anchor="ctr"/>
           <a:lstStyle/>
           <a:p>
-            <a:pPr indent="0" marL="0">
+            <a:pPr marL="0" indent="0">
               <a:buNone/>
             </a:pPr>
             <a:r>
@@ -18305,7 +18369,7 @@
           <a:bodyPr wrap="square" rtlCol="0" anchor="ctr"/>
           <a:lstStyle/>
           <a:p>
-            <a:pPr indent="0" marL="0">
+            <a:pPr marL="0" indent="0">
               <a:buNone/>
             </a:pPr>
             <a:r>
@@ -18322,7 +18386,7 @@
             <a:endParaRPr lang="en-US" sz="1100" dirty="0"/>
           </a:p>
           <a:p>
-            <a:pPr indent="0" marL="0">
+            <a:pPr marL="0" indent="0">
               <a:buNone/>
             </a:pPr>
             <a:r>
@@ -18390,7 +18454,7 @@
           <a:bodyPr wrap="square" rtlCol="0" anchor="ctr"/>
           <a:lstStyle/>
           <a:p>
-            <a:pPr indent="0" marL="0">
+            <a:pPr marL="0" indent="0">
               <a:buNone/>
             </a:pPr>
             <a:r>
@@ -18429,7 +18493,7 @@
           <a:bodyPr wrap="square" rtlCol="0" anchor="ctr"/>
           <a:lstStyle/>
           <a:p>
-            <a:pPr indent="0" marL="0">
+            <a:pPr marL="0" indent="0">
               <a:buNone/>
             </a:pPr>
             <a:r>
@@ -18748,4 +18812,299 @@
     </a:ext>
   </a:extLst>
 </a:theme>
+</file>
+
+<file path=ppt/theme/theme2.xml><?xml version="1.0" encoding="utf-8"?>
+<a:theme xmlns:a="http://schemas.openxmlformats.org/drawingml/2006/main" name="Office Theme">
+  <a:themeElements>
+    <a:clrScheme name="Office">
+      <a:dk1>
+        <a:sysClr val="windowText" lastClr="000000"/>
+      </a:dk1>
+      <a:lt1>
+        <a:sysClr val="window" lastClr="FFFFFF"/>
+      </a:lt1>
+      <a:dk2>
+        <a:srgbClr val="44546A"/>
+      </a:dk2>
+      <a:lt2>
+        <a:srgbClr val="E7E6E6"/>
+      </a:lt2>
+      <a:accent1>
+        <a:srgbClr val="4472C4"/>
+      </a:accent1>
+      <a:accent2>
+        <a:srgbClr val="ED7D31"/>
+      </a:accent2>
+      <a:accent3>
+        <a:srgbClr val="A5A5A5"/>
+      </a:accent3>
+      <a:accent4>
+        <a:srgbClr val="FFC000"/>
+      </a:accent4>
+      <a:accent5>
+        <a:srgbClr val="5B9BD5"/>
+      </a:accent5>
+      <a:accent6>
+        <a:srgbClr val="70AD47"/>
+      </a:accent6>
+      <a:hlink>
+        <a:srgbClr val="0563C1"/>
+      </a:hlink>
+      <a:folHlink>
+        <a:srgbClr val="954F72"/>
+      </a:folHlink>
+    </a:clrScheme>
+    <a:fontScheme name="Office">
+      <a:majorFont>
+        <a:latin typeface="Calibri Light" panose="020F0302020204030204"/>
+        <a:ea typeface=""/>
+        <a:cs typeface=""/>
+        <a:font script="Jpan" typeface="游ゴシック Light"/>
+        <a:font script="Hang" typeface="맑은 고딕"/>
+        <a:font script="Hans" typeface="等线 Light"/>
+        <a:font script="Hant" typeface="新細明體"/>
+        <a:font script="Arab" typeface="Times New Roman"/>
+        <a:font script="Hebr" typeface="Times New Roman"/>
+        <a:font script="Thai" typeface="Angsana New"/>
+        <a:font script="Ethi" typeface="Nyala"/>
+        <a:font script="Beng" typeface="Vrinda"/>
+        <a:font script="Gujr" typeface="Shruti"/>
+        <a:font script="Khmr" typeface="MoolBoran"/>
+        <a:font script="Knda" typeface="Tunga"/>
+        <a:font script="Guru" typeface="Raavi"/>
+        <a:font script="Cans" typeface="Euphemia"/>
+        <a:font script="Cher" typeface="Plantagenet Cherokee"/>
+        <a:font script="Yiii" typeface="Microsoft Yi Baiti"/>
+        <a:font script="Tibt" typeface="Microsoft Himalaya"/>
+        <a:font script="Thaa" typeface="MV Boli"/>
+        <a:font script="Deva" typeface="Mangal"/>
+        <a:font script="Telu" typeface="Gautami"/>
+        <a:font script="Taml" typeface="Latha"/>
+        <a:font script="Syrc" typeface="Estrangelo Edessa"/>
+        <a:font script="Orya" typeface="Kalinga"/>
+        <a:font script="Mlym" typeface="Kartika"/>
+        <a:font script="Laoo" typeface="DokChampa"/>
+        <a:font script="Sinh" typeface="Iskoola Pota"/>
+        <a:font script="Mong" typeface="Mongolian Baiti"/>
+        <a:font script="Viet" typeface="Times New Roman"/>
+        <a:font script="Uigh" typeface="Microsoft Uighur"/>
+        <a:font script="Geor" typeface="Sylfaen"/>
+        <a:font script="Armn" typeface="Arial"/>
+        <a:font script="Bugi" typeface="Leelawadee UI"/>
+        <a:font script="Bopo" typeface="Microsoft JhengHei"/>
+        <a:font script="Java" typeface="Javanese Text"/>
+        <a:font script="Lisu" typeface="Segoe UI"/>
+        <a:font script="Mymr" typeface="Myanmar Text"/>
+        <a:font script="Nkoo" typeface="Ebrima"/>
+        <a:font script="Olck" typeface="Nirmala UI"/>
+        <a:font script="Osma" typeface="Ebrima"/>
+        <a:font script="Phag" typeface="Phagspa"/>
+        <a:font script="Syrn" typeface="Estrangelo Edessa"/>
+        <a:font script="Syrj" typeface="Estrangelo Edessa"/>
+        <a:font script="Syre" typeface="Estrangelo Edessa"/>
+        <a:font script="Sora" typeface="Nirmala UI"/>
+        <a:font script="Tale" typeface="Microsoft Tai Le"/>
+        <a:font script="Talu" typeface="Microsoft New Tai Lue"/>
+        <a:font script="Tfng" typeface="Ebrima"/>
+      </a:majorFont>
+      <a:minorFont>
+        <a:latin typeface="Calibri" panose="020F0502020204030204"/>
+        <a:ea typeface=""/>
+        <a:cs typeface=""/>
+        <a:font script="Jpan" typeface="游ゴシック"/>
+        <a:font script="Hang" typeface="맑은 고딕"/>
+        <a:font script="Hans" typeface="等线"/>
+        <a:font script="Hant" typeface="新細明體"/>
+        <a:font script="Arab" typeface="Arial"/>
+        <a:font script="Hebr" typeface="Arial"/>
+        <a:font script="Thai" typeface="Cordia New"/>
+        <a:font script="Ethi" typeface="Nyala"/>
+        <a:font script="Beng" typeface="Vrinda"/>
+        <a:font script="Gujr" typeface="Shruti"/>
+        <a:font script="Khmr" typeface="DaunPenh"/>
+        <a:font script="Knda" typeface="Tunga"/>
+        <a:font script="Guru" typeface="Raavi"/>
+        <a:font script="Cans" typeface="Euphemia"/>
+        <a:font script="Cher" typeface="Plantagenet Cherokee"/>
+        <a:font script="Yiii" typeface="Microsoft Yi Baiti"/>
+        <a:font script="Tibt" typeface="Microsoft Himalaya"/>
+        <a:font script="Thaa" typeface="MV Boli"/>
+        <a:font script="Deva" typeface="Mangal"/>
+        <a:font script="Telu" typeface="Gautami"/>
+        <a:font script="Taml" typeface="Latha"/>
+        <a:font script="Syrc" typeface="Estrangelo Edessa"/>
+        <a:font script="Orya" typeface="Kalinga"/>
+        <a:font script="Mlym" typeface="Kartika"/>
+        <a:font script="Laoo" typeface="DokChampa"/>
+        <a:font script="Sinh" typeface="Iskoola Pota"/>
+        <a:font script="Mong" typeface="Mongolian Baiti"/>
+        <a:font script="Viet" typeface="Arial"/>
+        <a:font script="Uigh" typeface="Microsoft Uighur"/>
+        <a:font script="Geor" typeface="Sylfaen"/>
+        <a:font script="Armn" typeface="Arial"/>
+        <a:font script="Bugi" typeface="Leelawadee UI"/>
+        <a:font script="Bopo" typeface="Microsoft JhengHei"/>
+        <a:font script="Java" typeface="Javanese Text"/>
+        <a:font script="Lisu" typeface="Segoe UI"/>
+        <a:font script="Mymr" typeface="Myanmar Text"/>
+        <a:font script="Nkoo" typeface="Ebrima"/>
+        <a:font script="Olck" typeface="Nirmala UI"/>
+        <a:font script="Osma" typeface="Ebrima"/>
+        <a:font script="Phag" typeface="Phagspa"/>
+        <a:font script="Syrn" typeface="Estrangelo Edessa"/>
+        <a:font script="Syrj" typeface="Estrangelo Edessa"/>
+        <a:font script="Syre" typeface="Estrangelo Edessa"/>
+        <a:font script="Sora" typeface="Nirmala UI"/>
+        <a:font script="Tale" typeface="Microsoft Tai Le"/>
+        <a:font script="Talu" typeface="Microsoft New Tai Lue"/>
+        <a:font script="Tfng" typeface="Ebrima"/>
+      </a:minorFont>
+    </a:fontScheme>
+    <a:fmtScheme name="Office">
+      <a:fillStyleLst>
+        <a:solidFill>
+          <a:schemeClr val="phClr"/>
+        </a:solidFill>
+        <a:gradFill rotWithShape="1">
+          <a:gsLst>
+            <a:gs pos="0">
+              <a:schemeClr val="phClr">
+                <a:lumMod val="110000"/>
+                <a:satMod val="105000"/>
+                <a:tint val="67000"/>
+              </a:schemeClr>
+            </a:gs>
+            <a:gs pos="50000">
+              <a:schemeClr val="phClr">
+                <a:lumMod val="105000"/>
+                <a:satMod val="103000"/>
+                <a:tint val="73000"/>
+              </a:schemeClr>
+            </a:gs>
+            <a:gs pos="100000">
+              <a:schemeClr val="phClr">
+                <a:lumMod val="105000"/>
+                <a:satMod val="109000"/>
+                <a:tint val="81000"/>
+              </a:schemeClr>
+            </a:gs>
+          </a:gsLst>
+          <a:lin ang="5400000" scaled="0"/>
+        </a:gradFill>
+        <a:gradFill rotWithShape="1">
+          <a:gsLst>
+            <a:gs pos="0">
+              <a:schemeClr val="phClr">
+                <a:satMod val="103000"/>
+                <a:lumMod val="102000"/>
+                <a:tint val="94000"/>
+              </a:schemeClr>
+            </a:gs>
+            <a:gs pos="50000">
+              <a:schemeClr val="phClr">
+                <a:satMod val="110000"/>
+                <a:lumMod val="100000"/>
+                <a:shade val="100000"/>
+              </a:schemeClr>
+            </a:gs>
+            <a:gs pos="100000">
+              <a:schemeClr val="phClr">
+                <a:lumMod val="99000"/>
+                <a:satMod val="120000"/>
+                <a:shade val="78000"/>
+              </a:schemeClr>
+            </a:gs>
+          </a:gsLst>
+          <a:lin ang="5400000" scaled="0"/>
+        </a:gradFill>
+      </a:fillStyleLst>
+      <a:lnStyleLst>
+        <a:ln w="6350" cap="flat" cmpd="sng" algn="ctr">
+          <a:solidFill>
+            <a:schemeClr val="phClr"/>
+          </a:solidFill>
+          <a:prstDash val="solid"/>
+          <a:miter lim="800000"/>
+        </a:ln>
+        <a:ln w="12700" cap="flat" cmpd="sng" algn="ctr">
+          <a:solidFill>
+            <a:schemeClr val="phClr"/>
+          </a:solidFill>
+          <a:prstDash val="solid"/>
+          <a:miter lim="800000"/>
+        </a:ln>
+        <a:ln w="19050" cap="flat" cmpd="sng" algn="ctr">
+          <a:solidFill>
+            <a:schemeClr val="phClr"/>
+          </a:solidFill>
+          <a:prstDash val="solid"/>
+          <a:miter lim="800000"/>
+        </a:ln>
+      </a:lnStyleLst>
+      <a:effectStyleLst>
+        <a:effectStyle>
+          <a:effectLst/>
+        </a:effectStyle>
+        <a:effectStyle>
+          <a:effectLst/>
+        </a:effectStyle>
+        <a:effectStyle>
+          <a:effectLst>
+            <a:outerShdw blurRad="57150" dist="19050" dir="5400000" algn="ctr" rotWithShape="0">
+              <a:srgbClr val="000000">
+                <a:alpha val="63000"/>
+              </a:srgbClr>
+            </a:outerShdw>
+          </a:effectLst>
+        </a:effectStyle>
+      </a:effectStyleLst>
+      <a:bgFillStyleLst>
+        <a:solidFill>
+          <a:schemeClr val="phClr"/>
+        </a:solidFill>
+        <a:solidFill>
+          <a:schemeClr val="phClr">
+            <a:tint val="95000"/>
+            <a:satMod val="170000"/>
+          </a:schemeClr>
+        </a:solidFill>
+        <a:gradFill rotWithShape="1">
+          <a:gsLst>
+            <a:gs pos="0">
+              <a:schemeClr val="phClr">
+                <a:tint val="93000"/>
+                <a:satMod val="150000"/>
+                <a:shade val="98000"/>
+                <a:lumMod val="102000"/>
+              </a:schemeClr>
+            </a:gs>
+            <a:gs pos="50000">
+              <a:schemeClr val="phClr">
+                <a:tint val="98000"/>
+                <a:satMod val="130000"/>
+                <a:shade val="90000"/>
+                <a:lumMod val="103000"/>
+              </a:schemeClr>
+            </a:gs>
+            <a:gs pos="100000">
+              <a:schemeClr val="phClr">
+                <a:shade val="63000"/>
+                <a:satMod val="120000"/>
+              </a:schemeClr>
+            </a:gs>
+          </a:gsLst>
+          <a:lin ang="5400000" scaled="0"/>
+        </a:gradFill>
+      </a:bgFillStyleLst>
+    </a:fmtScheme>
+  </a:themeElements>
+  <a:objectDefaults/>
+  <a:extraClrSchemeLst/>
+  <a:extLst>
+    <a:ext uri="{05A4C25C-085E-4340-85A3-A5531E510DB2}">
+      <thm15:themeFamily xmlns:thm15="http://schemas.microsoft.com/office/thememl/2012/main" name="Office Theme" id="{62F939B6-93AF-4DB8-9C6B-D6C7DFDC589F}" vid="{4A3C46E8-61CC-4603-A589-7422A47A8E4A}"/>
+    </a:ext>
+  </a:extLst>
+</a:theme>
 </file>
</xml_diff>